<commit_message>
Remove uptime disclaimer from template, place in PerformanceReport method
</commit_message>
<xml_diff>
--- a/sensortoolkit/evaluation_objs/templates/PM25/Reporting_Template_Base_PM25.pptx
+++ b/sensortoolkit/evaluation_objs/templates/PM25/Reporting_Template_Base_PM25.pptx
@@ -480,6 +480,54 @@
             <pc:docMk/>
             <pc:sldMk cId="3695094907" sldId="260"/>
             <ac:graphicFrameMk id="8" creationId="{35CBF3A8-21BF-4348-8673-6D11DB01D959}"/>
+          </ac:graphicFrameMkLst>
+        </pc:graphicFrameChg>
+      </pc:sldChg>
+    </pc:docChg>
+  </pc:docChgLst>
+  <pc:docChgLst>
+    <pc:chgData name="Frederick, Samuel" userId="090dec4f-7d84-4616-bef6-b2226d1b24c4" providerId="ADAL" clId="{6EB9735C-16A3-4AB5-A5E6-DA3B6B555828}"/>
+    <pc:docChg chg="undo custSel modSld">
+      <pc:chgData name="Frederick, Samuel" userId="090dec4f-7d84-4616-bef6-b2226d1b24c4" providerId="ADAL" clId="{6EB9735C-16A3-4AB5-A5E6-DA3B6B555828}" dt="2022-03-08T15:48:25.148" v="34" actId="20577"/>
+      <pc:docMkLst>
+        <pc:docMk/>
+      </pc:docMkLst>
+      <pc:sldChg chg="addSp delSp modSp mod">
+        <pc:chgData name="Frederick, Samuel" userId="090dec4f-7d84-4616-bef6-b2226d1b24c4" providerId="ADAL" clId="{6EB9735C-16A3-4AB5-A5E6-DA3B6B555828}" dt="2022-03-08T15:48:25.148" v="34" actId="20577"/>
+        <pc:sldMkLst>
+          <pc:docMk/>
+          <pc:sldMk cId="1609848839" sldId="256"/>
+        </pc:sldMkLst>
+        <pc:spChg chg="add del">
+          <ac:chgData name="Frederick, Samuel" userId="090dec4f-7d84-4616-bef6-b2226d1b24c4" providerId="ADAL" clId="{6EB9735C-16A3-4AB5-A5E6-DA3B6B555828}" dt="2022-03-08T15:43:36.053" v="4" actId="22"/>
+          <ac:spMkLst>
+            <pc:docMk/>
+            <pc:sldMk cId="1609848839" sldId="256"/>
+            <ac:spMk id="32" creationId="{BD20FB1E-70F5-4365-BBBB-D71BD624831B}"/>
+          </ac:spMkLst>
+        </pc:spChg>
+        <pc:graphicFrameChg chg="add del mod">
+          <ac:chgData name="Frederick, Samuel" userId="090dec4f-7d84-4616-bef6-b2226d1b24c4" providerId="ADAL" clId="{6EB9735C-16A3-4AB5-A5E6-DA3B6B555828}" dt="2022-03-08T15:43:43.638" v="6"/>
+          <ac:graphicFrameMkLst>
+            <pc:docMk/>
+            <pc:sldMk cId="1609848839" sldId="256"/>
+            <ac:graphicFrameMk id="33" creationId="{5452DF6E-9C16-48E2-9CD6-3FE30C2D95DE}"/>
+          </ac:graphicFrameMkLst>
+        </pc:graphicFrameChg>
+        <pc:graphicFrameChg chg="add mod modGraphic">
+          <ac:chgData name="Frederick, Samuel" userId="090dec4f-7d84-4616-bef6-b2226d1b24c4" providerId="ADAL" clId="{6EB9735C-16A3-4AB5-A5E6-DA3B6B555828}" dt="2022-03-08T15:48:25.148" v="34" actId="20577"/>
+          <ac:graphicFrameMkLst>
+            <pc:docMk/>
+            <pc:sldMk cId="1609848839" sldId="256"/>
+            <ac:graphicFrameMk id="34" creationId="{D0B531C8-60C2-48F9-BB0F-5A2C4BDD52AD}"/>
+          </ac:graphicFrameMkLst>
+        </pc:graphicFrameChg>
+        <pc:graphicFrameChg chg="add del mod modGraphic">
+          <ac:chgData name="Frederick, Samuel" userId="090dec4f-7d84-4616-bef6-b2226d1b24c4" providerId="ADAL" clId="{6EB9735C-16A3-4AB5-A5E6-DA3B6B555828}" dt="2022-03-08T15:44:31.213" v="12" actId="21"/>
+          <ac:graphicFrameMkLst>
+            <pc:docMk/>
+            <pc:sldMk cId="1609848839" sldId="256"/>
+            <ac:graphicFrameMk id="49" creationId="{8441374A-C641-48D4-B774-EC64A11FB91C}"/>
           </ac:graphicFrameMkLst>
         </pc:graphicFrameChg>
       </pc:sldChg>
@@ -2904,7 +2952,7 @@
           <a:p>
             <a:fld id="{3086CAC7-D409-43E0-9239-3260F031D6D3}" type="datetimeFigureOut">
               <a:rPr lang="en-US" smtClean="0"/>
-              <a:t>6/25/2021</a:t>
+              <a:t>3/8/2022</a:t>
             </a:fld>
             <a:endParaRPr lang="en-US"/>
           </a:p>
@@ -3081,7 +3129,7 @@
           <a:p>
             <a:fld id="{3CA1DE52-DF04-4D3A-9C2F-16E440759AD9}" type="datetimeFigureOut">
               <a:rPr lang="en-US" smtClean="0"/>
-              <a:t>6/25/2021</a:t>
+              <a:t>3/8/2022</a:t>
             </a:fld>
             <a:endParaRPr lang="en-US"/>
           </a:p>
@@ -3963,49 +4011,6 @@
       </p:sp>
       <p:sp>
         <p:nvSpPr>
-          <p:cNvPr id="18" name="TextBox 17">
-            <a:extLst>
-              <a:ext uri="{FF2B5EF4-FFF2-40B4-BE49-F238E27FC236}">
-                <a16:creationId xmlns:a16="http://schemas.microsoft.com/office/drawing/2014/main" id="{D8B39F57-BF5C-45BE-82CA-DEA8E86392DA}"/>
-              </a:ext>
-            </a:extLst>
-          </p:cNvPr>
-          <p:cNvSpPr txBox="1"/>
-          <p:nvPr userDrawn="1"/>
-        </p:nvSpPr>
-        <p:spPr>
-          <a:xfrm>
-            <a:off x="463293" y="19680240"/>
-            <a:ext cx="14336669" cy="441146"/>
-          </a:xfrm>
-          <a:prstGeom prst="rect">
-            <a:avLst/>
-          </a:prstGeom>
-          <a:noFill/>
-        </p:spPr>
-        <p:txBody>
-          <a:bodyPr wrap="square" rtlCol="0">
-            <a:spAutoFit/>
-          </a:bodyPr>
-          <a:lstStyle/>
-          <a:p>
-            <a:r>
-              <a:rPr lang="en-US" sz="1700" baseline="30000" dirty="0"/>
-              <a:t>*This value is only a recommendation for ensuring data quality and is not included in the list of target values discussed in Section 4 of the </a:t>
-            </a:r>
-            <a:r>
-              <a:rPr lang="en-US" sz="1700" i="1" baseline="30000" dirty="0"/>
-              <a:t>Performance Testing Protocols, Metrics, and Target Values for Fine Particulate Matter Air Sensors</a:t>
-            </a:r>
-            <a:r>
-              <a:rPr lang="en-US" sz="1700" baseline="30000" dirty="0"/>
-              <a:t> document. </a:t>
-            </a:r>
-          </a:p>
-        </p:txBody>
-      </p:sp>
-      <p:sp>
-        <p:nvSpPr>
           <p:cNvPr id="11" name="Text Placeholder 4">
             <a:extLst>
               <a:ext uri="{FF2B5EF4-FFF2-40B4-BE49-F238E27FC236}">
@@ -5800,2098 +5805,6 @@
           </a:p>
         </p:txBody>
       </p:sp>
-      <p:graphicFrame>
-        <p:nvGraphicFramePr>
-          <p:cNvPr id="49" name="Table 18">
-            <a:extLst>
-              <a:ext uri="{FF2B5EF4-FFF2-40B4-BE49-F238E27FC236}">
-                <a16:creationId xmlns:a16="http://schemas.microsoft.com/office/drawing/2014/main" id="{8441374A-C641-48D4-B774-EC64A11FB91C}"/>
-              </a:ext>
-            </a:extLst>
-          </p:cNvPr>
-          <p:cNvGraphicFramePr>
-            <a:graphicFrameLocks noGrp="1"/>
-          </p:cNvGraphicFramePr>
-          <p:nvPr>
-            <p:extLst>
-              <p:ext uri="{D42A27DB-BD31-4B8C-83A1-F6EECF244321}">
-                <p14:modId xmlns:p14="http://schemas.microsoft.com/office/powerpoint/2010/main" val="1343679699"/>
-              </p:ext>
-            </p:extLst>
-          </p:nvPr>
-        </p:nvGraphicFramePr>
-        <p:xfrm>
-          <a:off x="5488238" y="2883433"/>
-          <a:ext cx="4522242" cy="4123943"/>
-        </p:xfrm>
-        <a:graphic>
-          <a:graphicData uri="http://schemas.openxmlformats.org/drawingml/2006/table">
-            <a:tbl>
-              <a:tblPr firstRow="1" bandRow="1">
-                <a:tableStyleId>{69CF1AB2-1976-4502-BF36-3FF5EA218861}</a:tableStyleId>
-              </a:tblPr>
-              <a:tblGrid>
-                <a:gridCol w="1736844">
-                  <a:extLst>
-                    <a:ext uri="{9D8B030D-6E8A-4147-A177-3AD203B41FA5}">
-                      <a16:colId xmlns:a16="http://schemas.microsoft.com/office/drawing/2014/main" val="3814208030"/>
-                    </a:ext>
-                  </a:extLst>
-                </a:gridCol>
-                <a:gridCol w="511578">
-                  <a:extLst>
-                    <a:ext uri="{9D8B030D-6E8A-4147-A177-3AD203B41FA5}">
-                      <a16:colId xmlns:a16="http://schemas.microsoft.com/office/drawing/2014/main" val="1546040442"/>
-                    </a:ext>
-                  </a:extLst>
-                </a:gridCol>
-                <a:gridCol w="416888">
-                  <a:extLst>
-                    <a:ext uri="{9D8B030D-6E8A-4147-A177-3AD203B41FA5}">
-                      <a16:colId xmlns:a16="http://schemas.microsoft.com/office/drawing/2014/main" val="763465666"/>
-                    </a:ext>
-                  </a:extLst>
-                </a:gridCol>
-                <a:gridCol w="928466">
-                  <a:extLst>
-                    <a:ext uri="{9D8B030D-6E8A-4147-A177-3AD203B41FA5}">
-                      <a16:colId xmlns:a16="http://schemas.microsoft.com/office/drawing/2014/main" val="1911725581"/>
-                    </a:ext>
-                  </a:extLst>
-                </a:gridCol>
-                <a:gridCol w="928466">
-                  <a:extLst>
-                    <a:ext uri="{9D8B030D-6E8A-4147-A177-3AD203B41FA5}">
-                      <a16:colId xmlns:a16="http://schemas.microsoft.com/office/drawing/2014/main" val="1354556242"/>
-                    </a:ext>
-                  </a:extLst>
-                </a:gridCol>
-              </a:tblGrid>
-              <a:tr h="448675">
-                <a:tc gridSpan="5">
-                  <a:txBody>
-                    <a:bodyPr/>
-                    <a:lstStyle/>
-                    <a:p>
-                      <a:pPr algn="ctr"/>
-                      <a:r>
-                        <a:rPr lang="en-US" sz="1400" b="1" dirty="0">
-                          <a:solidFill>
-                            <a:sysClr val="windowText" lastClr="000000"/>
-                          </a:solidFill>
-                          <a:latin typeface="+mn-lt"/>
-                        </a:rPr>
-                        <a:t>Sensor Information</a:t>
-                      </a:r>
-                    </a:p>
-                  </a:txBody>
-                  <a:tcPr marL="201168" marR="201168" marT="100584" marB="100584" anchor="ctr">
-                    <a:lnL w="12700" cap="flat" cmpd="sng" algn="ctr">
-                      <a:solidFill>
-                        <a:schemeClr val="bg1"/>
-                      </a:solidFill>
-                      <a:prstDash val="solid"/>
-                      <a:round/>
-                      <a:headEnd type="none" w="med" len="med"/>
-                      <a:tailEnd type="none" w="med" len="med"/>
-                    </a:lnL>
-                    <a:lnR w="12700" cap="flat" cmpd="sng" algn="ctr">
-                      <a:solidFill>
-                        <a:schemeClr val="bg1"/>
-                      </a:solidFill>
-                      <a:prstDash val="solid"/>
-                      <a:round/>
-                      <a:headEnd type="none" w="med" len="med"/>
-                      <a:tailEnd type="none" w="med" len="med"/>
-                    </a:lnR>
-                    <a:lnT w="12700" cap="flat" cmpd="sng" algn="ctr">
-                      <a:solidFill>
-                        <a:schemeClr val="bg1"/>
-                      </a:solidFill>
-                      <a:prstDash val="solid"/>
-                      <a:round/>
-                      <a:headEnd type="none" w="med" len="med"/>
-                      <a:tailEnd type="none" w="med" len="med"/>
-                    </a:lnT>
-                    <a:lnB w="12700" cap="flat" cmpd="sng" algn="ctr">
-                      <a:solidFill>
-                        <a:schemeClr val="bg1"/>
-                      </a:solidFill>
-                      <a:prstDash val="solid"/>
-                      <a:round/>
-                      <a:headEnd type="none" w="med" len="med"/>
-                      <a:tailEnd type="none" w="med" len="med"/>
-                    </a:lnB>
-                    <a:lnTlToBr w="12700" cmpd="sng">
-                      <a:noFill/>
-                      <a:prstDash val="solid"/>
-                    </a:lnTlToBr>
-                    <a:lnBlToTr w="12700" cmpd="sng">
-                      <a:noFill/>
-                      <a:prstDash val="solid"/>
-                    </a:lnBlToTr>
-                    <a:solidFill>
-                      <a:srgbClr val="BFD0EB"/>
-                    </a:solidFill>
-                  </a:tcPr>
-                </a:tc>
-                <a:tc hMerge="1">
-                  <a:txBody>
-                    <a:bodyPr/>
-                    <a:lstStyle/>
-                    <a:p>
-                      <a:pPr algn="ctr"/>
-                      <a:endParaRPr lang="en-US" sz="1400" dirty="0">
-                        <a:solidFill>
-                          <a:sysClr val="windowText" lastClr="000000"/>
-                        </a:solidFill>
-                        <a:latin typeface="+mn-lt"/>
-                      </a:endParaRPr>
-                    </a:p>
-                  </a:txBody>
-                  <a:tcPr marL="201168" marR="201168" marT="100584" marB="100584" anchor="ctr">
-                    <a:lnL w="12700" cap="flat" cmpd="sng" algn="ctr">
-                      <a:solidFill>
-                        <a:schemeClr val="bg1"/>
-                      </a:solidFill>
-                      <a:prstDash val="solid"/>
-                      <a:round/>
-                      <a:headEnd type="none" w="med" len="med"/>
-                      <a:tailEnd type="none" w="med" len="med"/>
-                    </a:lnL>
-                    <a:lnR w="12700" cap="flat" cmpd="sng" algn="ctr">
-                      <a:solidFill>
-                        <a:schemeClr val="bg1"/>
-                      </a:solidFill>
-                      <a:prstDash val="solid"/>
-                      <a:round/>
-                      <a:headEnd type="none" w="med" len="med"/>
-                      <a:tailEnd type="none" w="med" len="med"/>
-                    </a:lnR>
-                    <a:lnT w="12700" cap="flat" cmpd="sng" algn="ctr">
-                      <a:solidFill>
-                        <a:schemeClr val="bg1"/>
-                      </a:solidFill>
-                      <a:prstDash val="solid"/>
-                      <a:round/>
-                      <a:headEnd type="none" w="med" len="med"/>
-                      <a:tailEnd type="none" w="med" len="med"/>
-                    </a:lnT>
-                    <a:lnB w="12700" cap="flat" cmpd="sng" algn="ctr">
-                      <a:solidFill>
-                        <a:schemeClr val="bg1"/>
-                      </a:solidFill>
-                      <a:prstDash val="solid"/>
-                      <a:round/>
-                      <a:headEnd type="none" w="med" len="med"/>
-                      <a:tailEnd type="none" w="med" len="med"/>
-                    </a:lnB>
-                    <a:lnTlToBr w="12700" cmpd="sng">
-                      <a:noFill/>
-                      <a:prstDash val="solid"/>
-                    </a:lnTlToBr>
-                    <a:lnBlToTr w="12700" cmpd="sng">
-                      <a:noFill/>
-                      <a:prstDash val="solid"/>
-                    </a:lnBlToTr>
-                    <a:solidFill>
-                      <a:srgbClr val="E8EEF8"/>
-                    </a:solidFill>
-                  </a:tcPr>
-                </a:tc>
-                <a:tc hMerge="1">
-                  <a:txBody>
-                    <a:bodyPr/>
-                    <a:lstStyle/>
-                    <a:p>
-                      <a:endParaRPr lang="en-US"/>
-                    </a:p>
-                  </a:txBody>
-                  <a:tcPr/>
-                </a:tc>
-                <a:tc hMerge="1">
-                  <a:txBody>
-                    <a:bodyPr/>
-                    <a:lstStyle/>
-                    <a:p>
-                      <a:endParaRPr lang="en-US"/>
-                    </a:p>
-                  </a:txBody>
-                  <a:tcPr/>
-                </a:tc>
-                <a:tc hMerge="1">
-                  <a:txBody>
-                    <a:bodyPr/>
-                    <a:lstStyle/>
-                    <a:p>
-                      <a:endParaRPr lang="en-US"/>
-                    </a:p>
-                  </a:txBody>
-                  <a:tcPr>
-                    <a:lnL w="12700" cap="flat" cmpd="sng" algn="ctr">
-                      <a:solidFill>
-                        <a:schemeClr val="bg1"/>
-                      </a:solidFill>
-                      <a:prstDash val="solid"/>
-                      <a:round/>
-                      <a:headEnd type="none" w="med" len="med"/>
-                      <a:tailEnd type="none" w="med" len="med"/>
-                    </a:lnL>
-                  </a:tcPr>
-                </a:tc>
-                <a:extLst>
-                  <a:ext uri="{0D108BD9-81ED-4DB2-BD59-A6C34878D82A}">
-                    <a16:rowId xmlns:a16="http://schemas.microsoft.com/office/drawing/2014/main" val="2801822641"/>
-                  </a:ext>
-                </a:extLst>
-              </a:tr>
-              <a:tr h="488321">
-                <a:tc>
-                  <a:txBody>
-                    <a:bodyPr/>
-                    <a:lstStyle/>
-                    <a:p>
-                      <a:pPr algn="ctr"/>
-                      <a:r>
-                        <a:rPr lang="en-US" sz="1400" b="0" dirty="0">
-                          <a:solidFill>
-                            <a:sysClr val="windowText" lastClr="000000"/>
-                          </a:solidFill>
-                        </a:rPr>
-                        <a:t>Manufacturer, model</a:t>
-                      </a:r>
-                    </a:p>
-                  </a:txBody>
-                  <a:tcPr marL="45720" marR="45720" anchor="ctr">
-                    <a:lnL w="12700" cap="flat" cmpd="sng" algn="ctr">
-                      <a:solidFill>
-                        <a:schemeClr val="bg1"/>
-                      </a:solidFill>
-                      <a:prstDash val="solid"/>
-                      <a:round/>
-                      <a:headEnd type="none" w="med" len="med"/>
-                      <a:tailEnd type="none" w="med" len="med"/>
-                    </a:lnL>
-                    <a:lnR w="12700" cap="flat" cmpd="sng" algn="ctr">
-                      <a:solidFill>
-                        <a:schemeClr val="bg1"/>
-                      </a:solidFill>
-                      <a:prstDash val="solid"/>
-                      <a:round/>
-                      <a:headEnd type="none" w="med" len="med"/>
-                      <a:tailEnd type="none" w="med" len="med"/>
-                    </a:lnR>
-                    <a:lnT w="12700" cap="flat" cmpd="sng" algn="ctr">
-                      <a:solidFill>
-                        <a:schemeClr val="bg1"/>
-                      </a:solidFill>
-                      <a:prstDash val="solid"/>
-                      <a:round/>
-                      <a:headEnd type="none" w="med" len="med"/>
-                      <a:tailEnd type="none" w="med" len="med"/>
-                    </a:lnT>
-                    <a:lnB w="12700" cap="flat" cmpd="sng" algn="ctr">
-                      <a:solidFill>
-                        <a:schemeClr val="bg1"/>
-                      </a:solidFill>
-                      <a:prstDash val="solid"/>
-                      <a:round/>
-                      <a:headEnd type="none" w="med" len="med"/>
-                      <a:tailEnd type="none" w="med" len="med"/>
-                    </a:lnB>
-                    <a:lnTlToBr w="12700" cmpd="sng">
-                      <a:noFill/>
-                      <a:prstDash val="solid"/>
-                    </a:lnTlToBr>
-                    <a:lnBlToTr w="12700" cmpd="sng">
-                      <a:noFill/>
-                      <a:prstDash val="solid"/>
-                    </a:lnBlToTr>
-                    <a:solidFill>
-                      <a:srgbClr val="BFD0EB"/>
-                    </a:solidFill>
-                  </a:tcPr>
-                </a:tc>
-                <a:tc gridSpan="4">
-                  <a:txBody>
-                    <a:bodyPr/>
-                    <a:lstStyle/>
-                    <a:p>
-                      <a:pPr algn="ctr"/>
-                      <a:endParaRPr lang="en-US" sz="1400" dirty="0">
-                        <a:solidFill>
-                          <a:sysClr val="windowText" lastClr="000000"/>
-                        </a:solidFill>
-                        <a:latin typeface="+mn-lt"/>
-                      </a:endParaRPr>
-                    </a:p>
-                  </a:txBody>
-                  <a:tcPr marL="45720" marR="45720" anchor="ctr">
-                    <a:lnL w="12700" cap="flat" cmpd="sng" algn="ctr">
-                      <a:solidFill>
-                        <a:schemeClr val="bg1"/>
-                      </a:solidFill>
-                      <a:prstDash val="solid"/>
-                      <a:round/>
-                      <a:headEnd type="none" w="med" len="med"/>
-                      <a:tailEnd type="none" w="med" len="med"/>
-                    </a:lnL>
-                    <a:lnR w="12700" cap="flat" cmpd="sng" algn="ctr">
-                      <a:solidFill>
-                        <a:schemeClr val="bg1"/>
-                      </a:solidFill>
-                      <a:prstDash val="solid"/>
-                      <a:round/>
-                      <a:headEnd type="none" w="med" len="med"/>
-                      <a:tailEnd type="none" w="med" len="med"/>
-                    </a:lnR>
-                    <a:lnT w="12700" cap="flat" cmpd="sng" algn="ctr">
-                      <a:solidFill>
-                        <a:schemeClr val="bg1"/>
-                      </a:solidFill>
-                      <a:prstDash val="solid"/>
-                      <a:round/>
-                      <a:headEnd type="none" w="med" len="med"/>
-                      <a:tailEnd type="none" w="med" len="med"/>
-                    </a:lnT>
-                    <a:lnB w="12700" cap="flat" cmpd="sng" algn="ctr">
-                      <a:solidFill>
-                        <a:schemeClr val="bg1"/>
-                      </a:solidFill>
-                      <a:prstDash val="solid"/>
-                      <a:round/>
-                      <a:headEnd type="none" w="med" len="med"/>
-                      <a:tailEnd type="none" w="med" len="med"/>
-                    </a:lnB>
-                    <a:lnTlToBr w="12700" cmpd="sng">
-                      <a:noFill/>
-                      <a:prstDash val="solid"/>
-                    </a:lnTlToBr>
-                    <a:lnBlToTr w="12700" cmpd="sng">
-                      <a:noFill/>
-                      <a:prstDash val="solid"/>
-                    </a:lnBlToTr>
-                    <a:solidFill>
-                      <a:srgbClr val="E8EEF8"/>
-                    </a:solidFill>
-                  </a:tcPr>
-                </a:tc>
-                <a:tc hMerge="1">
-                  <a:txBody>
-                    <a:bodyPr/>
-                    <a:lstStyle/>
-                    <a:p>
-                      <a:endParaRPr lang="en-US"/>
-                    </a:p>
-                  </a:txBody>
-                  <a:tcPr/>
-                </a:tc>
-                <a:tc hMerge="1">
-                  <a:txBody>
-                    <a:bodyPr/>
-                    <a:lstStyle/>
-                    <a:p>
-                      <a:endParaRPr lang="en-US"/>
-                    </a:p>
-                  </a:txBody>
-                  <a:tcPr/>
-                </a:tc>
-                <a:tc hMerge="1">
-                  <a:txBody>
-                    <a:bodyPr/>
-                    <a:lstStyle/>
-                    <a:p>
-                      <a:endParaRPr lang="en-US"/>
-                    </a:p>
-                  </a:txBody>
-                  <a:tcPr>
-                    <a:lnL w="12700" cap="flat" cmpd="sng" algn="ctr">
-                      <a:solidFill>
-                        <a:schemeClr val="bg1"/>
-                      </a:solidFill>
-                      <a:prstDash val="solid"/>
-                      <a:round/>
-                      <a:headEnd type="none" w="med" len="med"/>
-                      <a:tailEnd type="none" w="med" len="med"/>
-                    </a:lnL>
-                  </a:tcPr>
-                </a:tc>
-                <a:extLst>
-                  <a:ext uri="{0D108BD9-81ED-4DB2-BD59-A6C34878D82A}">
-                    <a16:rowId xmlns:a16="http://schemas.microsoft.com/office/drawing/2014/main" val="1499110780"/>
-                  </a:ext>
-                </a:extLst>
-              </a:tr>
-              <a:tr h="523846">
-                <a:tc>
-                  <a:txBody>
-                    <a:bodyPr/>
-                    <a:lstStyle/>
-                    <a:p>
-                      <a:pPr algn="ctr"/>
-                      <a:r>
-                        <a:rPr lang="en-US" sz="1400" b="0" dirty="0">
-                          <a:solidFill>
-                            <a:sysClr val="windowText" lastClr="000000"/>
-                          </a:solidFill>
-                        </a:rPr>
-                        <a:t>Device firmware version</a:t>
-                      </a:r>
-                    </a:p>
-                  </a:txBody>
-                  <a:tcPr marL="45720" marR="45720" anchor="ctr">
-                    <a:lnL w="12700" cap="flat" cmpd="sng" algn="ctr">
-                      <a:solidFill>
-                        <a:schemeClr val="bg1"/>
-                      </a:solidFill>
-                      <a:prstDash val="solid"/>
-                      <a:round/>
-                      <a:headEnd type="none" w="med" len="med"/>
-                      <a:tailEnd type="none" w="med" len="med"/>
-                    </a:lnL>
-                    <a:lnR w="12700" cap="flat" cmpd="sng" algn="ctr">
-                      <a:solidFill>
-                        <a:schemeClr val="bg1"/>
-                      </a:solidFill>
-                      <a:prstDash val="solid"/>
-                      <a:round/>
-                      <a:headEnd type="none" w="med" len="med"/>
-                      <a:tailEnd type="none" w="med" len="med"/>
-                    </a:lnR>
-                    <a:lnT w="12700" cap="flat" cmpd="sng" algn="ctr">
-                      <a:solidFill>
-                        <a:schemeClr val="bg1"/>
-                      </a:solidFill>
-                      <a:prstDash val="solid"/>
-                      <a:round/>
-                      <a:headEnd type="none" w="med" len="med"/>
-                      <a:tailEnd type="none" w="med" len="med"/>
-                    </a:lnT>
-                    <a:lnB w="12700" cap="flat" cmpd="sng" algn="ctr">
-                      <a:solidFill>
-                        <a:schemeClr val="bg1"/>
-                      </a:solidFill>
-                      <a:prstDash val="solid"/>
-                      <a:round/>
-                      <a:headEnd type="none" w="med" len="med"/>
-                      <a:tailEnd type="none" w="med" len="med"/>
-                    </a:lnB>
-                    <a:lnTlToBr w="12700" cmpd="sng">
-                      <a:noFill/>
-                      <a:prstDash val="solid"/>
-                    </a:lnTlToBr>
-                    <a:lnBlToTr w="12700" cmpd="sng">
-                      <a:noFill/>
-                      <a:prstDash val="solid"/>
-                    </a:lnBlToTr>
-                    <a:solidFill>
-                      <a:srgbClr val="BFD0EB"/>
-                    </a:solidFill>
-                  </a:tcPr>
-                </a:tc>
-                <a:tc gridSpan="4">
-                  <a:txBody>
-                    <a:bodyPr/>
-                    <a:lstStyle/>
-                    <a:p>
-                      <a:pPr algn="ctr"/>
-                      <a:endParaRPr lang="en-US" sz="1400" dirty="0">
-                        <a:solidFill>
-                          <a:sysClr val="windowText" lastClr="000000"/>
-                        </a:solidFill>
-                        <a:latin typeface="+mn-lt"/>
-                      </a:endParaRPr>
-                    </a:p>
-                  </a:txBody>
-                  <a:tcPr marL="45720" marR="45720" anchor="ctr">
-                    <a:lnL w="12700" cap="flat" cmpd="sng" algn="ctr">
-                      <a:solidFill>
-                        <a:schemeClr val="bg1"/>
-                      </a:solidFill>
-                      <a:prstDash val="solid"/>
-                      <a:round/>
-                      <a:headEnd type="none" w="med" len="med"/>
-                      <a:tailEnd type="none" w="med" len="med"/>
-                    </a:lnL>
-                    <a:lnR w="12700" cap="flat" cmpd="sng" algn="ctr">
-                      <a:solidFill>
-                        <a:schemeClr val="bg1"/>
-                      </a:solidFill>
-                      <a:prstDash val="solid"/>
-                      <a:round/>
-                      <a:headEnd type="none" w="med" len="med"/>
-                      <a:tailEnd type="none" w="med" len="med"/>
-                    </a:lnR>
-                    <a:lnT w="12700" cap="flat" cmpd="sng" algn="ctr">
-                      <a:solidFill>
-                        <a:schemeClr val="bg1"/>
-                      </a:solidFill>
-                      <a:prstDash val="solid"/>
-                      <a:round/>
-                      <a:headEnd type="none" w="med" len="med"/>
-                      <a:tailEnd type="none" w="med" len="med"/>
-                    </a:lnT>
-                    <a:lnB w="12700" cap="flat" cmpd="sng" algn="ctr">
-                      <a:solidFill>
-                        <a:schemeClr val="bg1"/>
-                      </a:solidFill>
-                      <a:prstDash val="solid"/>
-                      <a:round/>
-                      <a:headEnd type="none" w="med" len="med"/>
-                      <a:tailEnd type="none" w="med" len="med"/>
-                    </a:lnB>
-                    <a:lnTlToBr w="12700" cmpd="sng">
-                      <a:noFill/>
-                      <a:prstDash val="solid"/>
-                    </a:lnTlToBr>
-                    <a:lnBlToTr w="12700" cmpd="sng">
-                      <a:noFill/>
-                      <a:prstDash val="solid"/>
-                    </a:lnBlToTr>
-                    <a:solidFill>
-                      <a:srgbClr val="E8EEF8"/>
-                    </a:solidFill>
-                  </a:tcPr>
-                </a:tc>
-                <a:tc hMerge="1">
-                  <a:txBody>
-                    <a:bodyPr/>
-                    <a:lstStyle/>
-                    <a:p>
-                      <a:endParaRPr lang="en-US"/>
-                    </a:p>
-                  </a:txBody>
-                  <a:tcPr/>
-                </a:tc>
-                <a:tc hMerge="1">
-                  <a:txBody>
-                    <a:bodyPr/>
-                    <a:lstStyle/>
-                    <a:p>
-                      <a:endParaRPr lang="en-US"/>
-                    </a:p>
-                  </a:txBody>
-                  <a:tcPr/>
-                </a:tc>
-                <a:tc hMerge="1">
-                  <a:txBody>
-                    <a:bodyPr/>
-                    <a:lstStyle/>
-                    <a:p>
-                      <a:endParaRPr lang="en-US"/>
-                    </a:p>
-                  </a:txBody>
-                  <a:tcPr>
-                    <a:lnL w="12700" cap="flat" cmpd="sng" algn="ctr">
-                      <a:solidFill>
-                        <a:schemeClr val="bg1"/>
-                      </a:solidFill>
-                      <a:prstDash val="solid"/>
-                      <a:round/>
-                      <a:headEnd type="none" w="med" len="med"/>
-                      <a:tailEnd type="none" w="med" len="med"/>
-                    </a:lnL>
-                  </a:tcPr>
-                </a:tc>
-                <a:extLst>
-                  <a:ext uri="{0D108BD9-81ED-4DB2-BD59-A6C34878D82A}">
-                    <a16:rowId xmlns:a16="http://schemas.microsoft.com/office/drawing/2014/main" val="337105121"/>
-                  </a:ext>
-                </a:extLst>
-              </a:tr>
-              <a:tr h="523846">
-                <a:tc>
-                  <a:txBody>
-                    <a:bodyPr/>
-                    <a:lstStyle/>
-                    <a:p>
-                      <a:pPr algn="ctr"/>
-                      <a:r>
-                        <a:rPr lang="en-US" sz="1400" b="0" dirty="0">
-                          <a:solidFill>
-                            <a:sysClr val="windowText" lastClr="000000"/>
-                          </a:solidFill>
-                        </a:rPr>
-                        <a:t>Sampling time </a:t>
-                      </a:r>
-                    </a:p>
-                    <a:p>
-                      <a:pPr algn="ctr"/>
-                      <a:r>
-                        <a:rPr lang="en-US" sz="1400" b="0" dirty="0">
-                          <a:solidFill>
-                            <a:sysClr val="windowText" lastClr="000000"/>
-                          </a:solidFill>
-                        </a:rPr>
-                        <a:t>interval</a:t>
-                      </a:r>
-                    </a:p>
-                  </a:txBody>
-                  <a:tcPr marL="45720" marR="45720" anchor="ctr">
-                    <a:lnL w="12700" cap="flat" cmpd="sng" algn="ctr">
-                      <a:solidFill>
-                        <a:schemeClr val="bg1"/>
-                      </a:solidFill>
-                      <a:prstDash val="solid"/>
-                      <a:round/>
-                      <a:headEnd type="none" w="med" len="med"/>
-                      <a:tailEnd type="none" w="med" len="med"/>
-                    </a:lnL>
-                    <a:lnR w="12700" cap="flat" cmpd="sng" algn="ctr">
-                      <a:solidFill>
-                        <a:schemeClr val="bg1"/>
-                      </a:solidFill>
-                      <a:prstDash val="solid"/>
-                      <a:round/>
-                      <a:headEnd type="none" w="med" len="med"/>
-                      <a:tailEnd type="none" w="med" len="med"/>
-                    </a:lnR>
-                    <a:lnT w="12700" cap="flat" cmpd="sng" algn="ctr">
-                      <a:solidFill>
-                        <a:schemeClr val="bg1"/>
-                      </a:solidFill>
-                      <a:prstDash val="solid"/>
-                      <a:round/>
-                      <a:headEnd type="none" w="med" len="med"/>
-                      <a:tailEnd type="none" w="med" len="med"/>
-                    </a:lnT>
-                    <a:lnB w="12700" cap="flat" cmpd="sng" algn="ctr">
-                      <a:solidFill>
-                        <a:schemeClr val="bg1"/>
-                      </a:solidFill>
-                      <a:prstDash val="solid"/>
-                      <a:round/>
-                      <a:headEnd type="none" w="med" len="med"/>
-                      <a:tailEnd type="none" w="med" len="med"/>
-                    </a:lnB>
-                    <a:lnTlToBr w="12700" cmpd="sng">
-                      <a:noFill/>
-                      <a:prstDash val="solid"/>
-                    </a:lnTlToBr>
-                    <a:lnBlToTr w="12700" cmpd="sng">
-                      <a:noFill/>
-                      <a:prstDash val="solid"/>
-                    </a:lnBlToTr>
-                    <a:solidFill>
-                      <a:srgbClr val="BFD0EB"/>
-                    </a:solidFill>
-                  </a:tcPr>
-                </a:tc>
-                <a:tc gridSpan="4">
-                  <a:txBody>
-                    <a:bodyPr/>
-                    <a:lstStyle/>
-                    <a:p>
-                      <a:pPr algn="ctr"/>
-                      <a:endParaRPr lang="en-US" sz="1400" dirty="0">
-                        <a:solidFill>
-                          <a:sysClr val="windowText" lastClr="000000"/>
-                        </a:solidFill>
-                        <a:latin typeface="+mn-lt"/>
-                      </a:endParaRPr>
-                    </a:p>
-                  </a:txBody>
-                  <a:tcPr marL="45720" marR="45720" anchor="ctr">
-                    <a:lnL w="12700" cap="flat" cmpd="sng" algn="ctr">
-                      <a:solidFill>
-                        <a:schemeClr val="bg1"/>
-                      </a:solidFill>
-                      <a:prstDash val="solid"/>
-                      <a:round/>
-                      <a:headEnd type="none" w="med" len="med"/>
-                      <a:tailEnd type="none" w="med" len="med"/>
-                    </a:lnL>
-                    <a:lnR w="12700" cap="flat" cmpd="sng" algn="ctr">
-                      <a:solidFill>
-                        <a:schemeClr val="bg1"/>
-                      </a:solidFill>
-                      <a:prstDash val="solid"/>
-                      <a:round/>
-                      <a:headEnd type="none" w="med" len="med"/>
-                      <a:tailEnd type="none" w="med" len="med"/>
-                    </a:lnR>
-                    <a:lnT w="12700" cap="flat" cmpd="sng" algn="ctr">
-                      <a:solidFill>
-                        <a:schemeClr val="bg1"/>
-                      </a:solidFill>
-                      <a:prstDash val="solid"/>
-                      <a:round/>
-                      <a:headEnd type="none" w="med" len="med"/>
-                      <a:tailEnd type="none" w="med" len="med"/>
-                    </a:lnT>
-                    <a:lnB w="12700" cap="flat" cmpd="sng" algn="ctr">
-                      <a:solidFill>
-                        <a:srgbClr val="FFFFFF"/>
-                      </a:solidFill>
-                      <a:prstDash val="solid"/>
-                      <a:round/>
-                      <a:headEnd type="none" w="med" len="med"/>
-                      <a:tailEnd type="none" w="med" len="med"/>
-                    </a:lnB>
-                    <a:lnTlToBr w="12700" cmpd="sng">
-                      <a:noFill/>
-                      <a:prstDash val="solid"/>
-                    </a:lnTlToBr>
-                    <a:lnBlToTr w="12700" cmpd="sng">
-                      <a:noFill/>
-                      <a:prstDash val="solid"/>
-                    </a:lnBlToTr>
-                    <a:solidFill>
-                      <a:srgbClr val="E8EEF8"/>
-                    </a:solidFill>
-                  </a:tcPr>
-                </a:tc>
-                <a:tc hMerge="1">
-                  <a:txBody>
-                    <a:bodyPr/>
-                    <a:lstStyle/>
-                    <a:p>
-                      <a:endParaRPr lang="en-US"/>
-                    </a:p>
-                  </a:txBody>
-                  <a:tcPr/>
-                </a:tc>
-                <a:tc hMerge="1">
-                  <a:txBody>
-                    <a:bodyPr/>
-                    <a:lstStyle/>
-                    <a:p>
-                      <a:endParaRPr lang="en-US"/>
-                    </a:p>
-                  </a:txBody>
-                  <a:tcPr/>
-                </a:tc>
-                <a:tc hMerge="1">
-                  <a:txBody>
-                    <a:bodyPr/>
-                    <a:lstStyle/>
-                    <a:p>
-                      <a:endParaRPr lang="en-US"/>
-                    </a:p>
-                  </a:txBody>
-                  <a:tcPr>
-                    <a:lnL w="12700" cap="flat" cmpd="sng" algn="ctr">
-                      <a:solidFill>
-                        <a:schemeClr val="bg1"/>
-                      </a:solidFill>
-                      <a:prstDash val="solid"/>
-                      <a:round/>
-                      <a:headEnd type="none" w="med" len="med"/>
-                      <a:tailEnd type="none" w="med" len="med"/>
-                    </a:lnL>
-                  </a:tcPr>
-                </a:tc>
-                <a:extLst>
-                  <a:ext uri="{0D108BD9-81ED-4DB2-BD59-A6C34878D82A}">
-                    <a16:rowId xmlns:a16="http://schemas.microsoft.com/office/drawing/2014/main" val="3905263702"/>
-                  </a:ext>
-                </a:extLst>
-              </a:tr>
-              <a:tr h="454025">
-                <a:tc rowSpan="3">
-                  <a:txBody>
-                    <a:bodyPr/>
-                    <a:lstStyle/>
-                    <a:p>
-                      <a:pPr algn="ctr"/>
-                      <a:r>
-                        <a:rPr lang="en-US" sz="1400" dirty="0">
-                          <a:solidFill>
-                            <a:sysClr val="windowText" lastClr="000000"/>
-                          </a:solidFill>
-                        </a:rPr>
-                        <a:t>Sensor serial </a:t>
-                      </a:r>
-                    </a:p>
-                    <a:p>
-                      <a:pPr algn="ctr"/>
-                      <a:r>
-                        <a:rPr lang="en-US" sz="1400" dirty="0">
-                          <a:solidFill>
-                            <a:sysClr val="windowText" lastClr="000000"/>
-                          </a:solidFill>
-                        </a:rPr>
-                        <a:t>numbers</a:t>
-                      </a:r>
-                    </a:p>
-                  </a:txBody>
-                  <a:tcPr marL="45720" marR="45720" anchor="ctr">
-                    <a:lnL w="12700" cap="flat" cmpd="sng" algn="ctr">
-                      <a:solidFill>
-                        <a:schemeClr val="bg1"/>
-                      </a:solidFill>
-                      <a:prstDash val="solid"/>
-                      <a:round/>
-                      <a:headEnd type="none" w="med" len="med"/>
-                      <a:tailEnd type="none" w="med" len="med"/>
-                    </a:lnL>
-                    <a:lnR w="12700" cap="flat" cmpd="sng" algn="ctr">
-                      <a:solidFill>
-                        <a:schemeClr val="bg1"/>
-                      </a:solidFill>
-                      <a:prstDash val="solid"/>
-                      <a:round/>
-                      <a:headEnd type="none" w="med" len="med"/>
-                      <a:tailEnd type="none" w="med" len="med"/>
-                    </a:lnR>
-                    <a:lnT w="12700" cap="flat" cmpd="sng" algn="ctr">
-                      <a:solidFill>
-                        <a:schemeClr val="bg1"/>
-                      </a:solidFill>
-                      <a:prstDash val="solid"/>
-                      <a:round/>
-                      <a:headEnd type="none" w="med" len="med"/>
-                      <a:tailEnd type="none" w="med" len="med"/>
-                    </a:lnT>
-                    <a:lnB w="12700" cap="flat" cmpd="sng" algn="ctr">
-                      <a:solidFill>
-                        <a:schemeClr val="bg1"/>
-                      </a:solidFill>
-                      <a:prstDash val="solid"/>
-                      <a:round/>
-                      <a:headEnd type="none" w="med" len="med"/>
-                      <a:tailEnd type="none" w="med" len="med"/>
-                    </a:lnB>
-                    <a:lnTlToBr w="12700" cmpd="sng">
-                      <a:noFill/>
-                      <a:prstDash val="solid"/>
-                    </a:lnTlToBr>
-                    <a:lnBlToTr w="12700" cmpd="sng">
-                      <a:noFill/>
-                      <a:prstDash val="solid"/>
-                    </a:lnBlToTr>
-                    <a:solidFill>
-                      <a:srgbClr val="BFD0EB"/>
-                    </a:solidFill>
-                  </a:tcPr>
-                </a:tc>
-                <a:tc gridSpan="2">
-                  <a:txBody>
-                    <a:bodyPr/>
-                    <a:lstStyle/>
-                    <a:p>
-                      <a:pPr marL="0" marR="0" lvl="0" indent="0" algn="ctr" defTabSz="1554480" rtl="0" eaLnBrk="1" fontAlgn="auto" latinLnBrk="0" hangingPunct="1">
-                        <a:lnSpc>
-                          <a:spcPct val="100000"/>
-                        </a:lnSpc>
-                        <a:spcBef>
-                          <a:spcPts val="0"/>
-                        </a:spcBef>
-                        <a:spcAft>
-                          <a:spcPts val="0"/>
-                        </a:spcAft>
-                        <a:buClrTx/>
-                        <a:buSzTx/>
-                        <a:buFontTx/>
-                        <a:buNone/>
-                        <a:tabLst/>
-                        <a:defRPr/>
-                      </a:pPr>
-                      <a:endParaRPr lang="en-US" sz="1050" dirty="0">
-                        <a:solidFill>
-                          <a:sysClr val="windowText" lastClr="000000"/>
-                        </a:solidFill>
-                        <a:latin typeface="+mn-lt"/>
-                      </a:endParaRPr>
-                    </a:p>
-                  </a:txBody>
-                  <a:tcPr marL="45720" marR="45720" anchor="ctr">
-                    <a:lnL w="12700" cap="flat" cmpd="sng" algn="ctr">
-                      <a:solidFill>
-                        <a:schemeClr val="bg1"/>
-                      </a:solidFill>
-                      <a:prstDash val="solid"/>
-                      <a:round/>
-                      <a:headEnd type="none" w="med" len="med"/>
-                      <a:tailEnd type="none" w="med" len="med"/>
-                    </a:lnL>
-                    <a:lnR w="12700" cap="flat" cmpd="sng" algn="ctr">
-                      <a:solidFill>
-                        <a:schemeClr val="bg1"/>
-                      </a:solidFill>
-                      <a:prstDash val="solid"/>
-                      <a:round/>
-                      <a:headEnd type="none" w="med" len="med"/>
-                      <a:tailEnd type="none" w="med" len="med"/>
-                    </a:lnR>
-                    <a:lnT w="12700" cap="flat" cmpd="sng" algn="ctr">
-                      <a:solidFill>
-                        <a:srgbClr val="FFFFFF"/>
-                      </a:solidFill>
-                      <a:prstDash val="solid"/>
-                      <a:round/>
-                      <a:headEnd type="none" w="med" len="med"/>
-                      <a:tailEnd type="none" w="med" len="med"/>
-                    </a:lnT>
-                    <a:lnB w="12700" cap="flat" cmpd="sng" algn="ctr">
-                      <a:solidFill>
-                        <a:schemeClr val="bg1"/>
-                      </a:solidFill>
-                      <a:prstDash val="solid"/>
-                      <a:round/>
-                      <a:headEnd type="none" w="med" len="med"/>
-                      <a:tailEnd type="none" w="med" len="med"/>
-                    </a:lnB>
-                    <a:lnTlToBr w="12700" cmpd="sng">
-                      <a:noFill/>
-                      <a:prstDash val="solid"/>
-                    </a:lnTlToBr>
-                    <a:lnBlToTr w="12700" cmpd="sng">
-                      <a:noFill/>
-                      <a:prstDash val="solid"/>
-                    </a:lnBlToTr>
-                    <a:solidFill>
-                      <a:srgbClr val="E8EEF8"/>
-                    </a:solidFill>
-                  </a:tcPr>
-                </a:tc>
-                <a:tc hMerge="1">
-                  <a:txBody>
-                    <a:bodyPr/>
-                    <a:lstStyle/>
-                    <a:p>
-                      <a:pPr algn="ctr"/>
-                      <a:endParaRPr lang="en-US" sz="1400" dirty="0">
-                        <a:solidFill>
-                          <a:sysClr val="windowText" lastClr="000000"/>
-                        </a:solidFill>
-                        <a:latin typeface="+mn-lt"/>
-                      </a:endParaRPr>
-                    </a:p>
-                  </a:txBody>
-                  <a:tcPr marL="201168" marR="201168" marT="100584" marB="100584" anchor="ctr">
-                    <a:lnL w="12700" cap="flat" cmpd="sng" algn="ctr">
-                      <a:solidFill>
-                        <a:schemeClr val="bg1"/>
-                      </a:solidFill>
-                      <a:prstDash val="solid"/>
-                      <a:round/>
-                      <a:headEnd type="none" w="med" len="med"/>
-                      <a:tailEnd type="none" w="med" len="med"/>
-                    </a:lnL>
-                    <a:lnR w="12700" cap="flat" cmpd="sng" algn="ctr">
-                      <a:solidFill>
-                        <a:schemeClr val="bg1"/>
-                      </a:solidFill>
-                      <a:prstDash val="solid"/>
-                      <a:round/>
-                      <a:headEnd type="none" w="med" len="med"/>
-                      <a:tailEnd type="none" w="med" len="med"/>
-                    </a:lnR>
-                    <a:lnT w="12700" cap="flat" cmpd="sng" algn="ctr">
-                      <a:solidFill>
-                        <a:schemeClr val="bg1"/>
-                      </a:solidFill>
-                      <a:prstDash val="solid"/>
-                      <a:round/>
-                      <a:headEnd type="none" w="med" len="med"/>
-                      <a:tailEnd type="none" w="med" len="med"/>
-                    </a:lnT>
-                    <a:lnB w="12700" cap="flat" cmpd="sng" algn="ctr">
-                      <a:solidFill>
-                        <a:schemeClr val="bg1"/>
-                      </a:solidFill>
-                      <a:prstDash val="solid"/>
-                      <a:round/>
-                      <a:headEnd type="none" w="med" len="med"/>
-                      <a:tailEnd type="none" w="med" len="med"/>
-                    </a:lnB>
-                    <a:lnTlToBr w="12700" cmpd="sng">
-                      <a:noFill/>
-                      <a:prstDash val="solid"/>
-                    </a:lnTlToBr>
-                    <a:lnBlToTr w="12700" cmpd="sng">
-                      <a:noFill/>
-                      <a:prstDash val="solid"/>
-                    </a:lnBlToTr>
-                    <a:solidFill>
-                      <a:srgbClr val="E8EEF8"/>
-                    </a:solidFill>
-                  </a:tcPr>
-                </a:tc>
-                <a:tc>
-                  <a:txBody>
-                    <a:bodyPr/>
-                    <a:lstStyle/>
-                    <a:p>
-                      <a:pPr algn="ctr"/>
-                      <a:endParaRPr lang="en-US" sz="1400" dirty="0">
-                        <a:solidFill>
-                          <a:sysClr val="windowText" lastClr="000000"/>
-                        </a:solidFill>
-                        <a:latin typeface="+mn-lt"/>
-                      </a:endParaRPr>
-                    </a:p>
-                  </a:txBody>
-                  <a:tcPr marL="45720" marR="45720" anchor="ctr">
-                    <a:lnL w="12700" cap="flat" cmpd="sng" algn="ctr">
-                      <a:solidFill>
-                        <a:schemeClr val="bg1"/>
-                      </a:solidFill>
-                      <a:prstDash val="solid"/>
-                      <a:round/>
-                      <a:headEnd type="none" w="med" len="med"/>
-                      <a:tailEnd type="none" w="med" len="med"/>
-                    </a:lnL>
-                    <a:lnR w="12700" cap="flat" cmpd="sng" algn="ctr">
-                      <a:solidFill>
-                        <a:schemeClr val="bg1"/>
-                      </a:solidFill>
-                      <a:prstDash val="solid"/>
-                      <a:round/>
-                      <a:headEnd type="none" w="med" len="med"/>
-                      <a:tailEnd type="none" w="med" len="med"/>
-                    </a:lnR>
-                    <a:lnT w="12700" cap="flat" cmpd="sng" algn="ctr">
-                      <a:solidFill>
-                        <a:srgbClr val="FFFFFF"/>
-                      </a:solidFill>
-                      <a:prstDash val="solid"/>
-                      <a:round/>
-                      <a:headEnd type="none" w="med" len="med"/>
-                      <a:tailEnd type="none" w="med" len="med"/>
-                    </a:lnT>
-                    <a:lnB w="12700" cap="flat" cmpd="sng" algn="ctr">
-                      <a:solidFill>
-                        <a:schemeClr val="bg1"/>
-                      </a:solidFill>
-                      <a:prstDash val="solid"/>
-                      <a:round/>
-                      <a:headEnd type="none" w="med" len="med"/>
-                      <a:tailEnd type="none" w="med" len="med"/>
-                    </a:lnB>
-                    <a:lnTlToBr w="12700" cmpd="sng">
-                      <a:noFill/>
-                      <a:prstDash val="solid"/>
-                    </a:lnTlToBr>
-                    <a:lnBlToTr w="12700" cmpd="sng">
-                      <a:noFill/>
-                      <a:prstDash val="solid"/>
-                    </a:lnBlToTr>
-                    <a:solidFill>
-                      <a:srgbClr val="E8EEF8"/>
-                    </a:solidFill>
-                  </a:tcPr>
-                </a:tc>
-                <a:tc>
-                  <a:txBody>
-                    <a:bodyPr/>
-                    <a:lstStyle/>
-                    <a:p>
-                      <a:pPr algn="ctr"/>
-                      <a:endParaRPr lang="en-US" sz="1400" dirty="0">
-                        <a:solidFill>
-                          <a:sysClr val="windowText" lastClr="000000"/>
-                        </a:solidFill>
-                        <a:latin typeface="+mn-lt"/>
-                      </a:endParaRPr>
-                    </a:p>
-                  </a:txBody>
-                  <a:tcPr marL="45720" marR="45720" anchor="ctr">
-                    <a:lnL w="12700" cap="flat" cmpd="sng" algn="ctr">
-                      <a:solidFill>
-                        <a:schemeClr val="bg1"/>
-                      </a:solidFill>
-                      <a:prstDash val="solid"/>
-                      <a:round/>
-                      <a:headEnd type="none" w="med" len="med"/>
-                      <a:tailEnd type="none" w="med" len="med"/>
-                    </a:lnL>
-                    <a:lnR w="12700" cap="flat" cmpd="sng" algn="ctr">
-                      <a:solidFill>
-                        <a:schemeClr val="bg1"/>
-                      </a:solidFill>
-                      <a:prstDash val="solid"/>
-                      <a:round/>
-                      <a:headEnd type="none" w="med" len="med"/>
-                      <a:tailEnd type="none" w="med" len="med"/>
-                    </a:lnR>
-                    <a:lnT w="12700" cap="flat" cmpd="sng" algn="ctr">
-                      <a:solidFill>
-                        <a:srgbClr val="FFFFFF"/>
-                      </a:solidFill>
-                      <a:prstDash val="solid"/>
-                      <a:round/>
-                      <a:headEnd type="none" w="med" len="med"/>
-                      <a:tailEnd type="none" w="med" len="med"/>
-                    </a:lnT>
-                    <a:lnB w="12700" cap="flat" cmpd="sng" algn="ctr">
-                      <a:solidFill>
-                        <a:schemeClr val="bg1"/>
-                      </a:solidFill>
-                      <a:prstDash val="solid"/>
-                      <a:round/>
-                      <a:headEnd type="none" w="med" len="med"/>
-                      <a:tailEnd type="none" w="med" len="med"/>
-                    </a:lnB>
-                    <a:lnTlToBr w="12700" cmpd="sng">
-                      <a:noFill/>
-                      <a:prstDash val="solid"/>
-                    </a:lnTlToBr>
-                    <a:lnBlToTr w="12700" cmpd="sng">
-                      <a:noFill/>
-                      <a:prstDash val="solid"/>
-                    </a:lnBlToTr>
-                    <a:solidFill>
-                      <a:srgbClr val="E8EEF8"/>
-                    </a:solidFill>
-                  </a:tcPr>
-                </a:tc>
-                <a:extLst>
-                  <a:ext uri="{0D108BD9-81ED-4DB2-BD59-A6C34878D82A}">
-                    <a16:rowId xmlns:a16="http://schemas.microsoft.com/office/drawing/2014/main" val="1925963944"/>
-                  </a:ext>
-                </a:extLst>
-              </a:tr>
-              <a:tr h="454025">
-                <a:tc vMerge="1">
-                  <a:txBody>
-                    <a:bodyPr/>
-                    <a:lstStyle/>
-                    <a:p>
-                      <a:pPr algn="ctr"/>
-                      <a:endParaRPr lang="en-US" sz="1400" dirty="0">
-                        <a:solidFill>
-                          <a:sysClr val="windowText" lastClr="000000"/>
-                        </a:solidFill>
-                      </a:endParaRPr>
-                    </a:p>
-                  </a:txBody>
-                  <a:tcPr marL="45720" marR="45720" anchor="ctr">
-                    <a:lnL w="12700" cap="flat" cmpd="sng" algn="ctr">
-                      <a:solidFill>
-                        <a:schemeClr val="bg1"/>
-                      </a:solidFill>
-                      <a:prstDash val="solid"/>
-                      <a:round/>
-                      <a:headEnd type="none" w="med" len="med"/>
-                      <a:tailEnd type="none" w="med" len="med"/>
-                    </a:lnL>
-                    <a:lnR w="12700" cap="flat" cmpd="sng" algn="ctr">
-                      <a:solidFill>
-                        <a:schemeClr val="bg1"/>
-                      </a:solidFill>
-                      <a:prstDash val="solid"/>
-                      <a:round/>
-                      <a:headEnd type="none" w="med" len="med"/>
-                      <a:tailEnd type="none" w="med" len="med"/>
-                    </a:lnR>
-                    <a:lnT w="12700" cap="flat" cmpd="sng" algn="ctr">
-                      <a:solidFill>
-                        <a:schemeClr val="bg1"/>
-                      </a:solidFill>
-                      <a:prstDash val="solid"/>
-                      <a:round/>
-                      <a:headEnd type="none" w="med" len="med"/>
-                      <a:tailEnd type="none" w="med" len="med"/>
-                    </a:lnT>
-                    <a:lnB w="12700" cap="flat" cmpd="sng" algn="ctr">
-                      <a:solidFill>
-                        <a:schemeClr val="bg1"/>
-                      </a:solidFill>
-                      <a:prstDash val="solid"/>
-                      <a:round/>
-                      <a:headEnd type="none" w="med" len="med"/>
-                      <a:tailEnd type="none" w="med" len="med"/>
-                    </a:lnB>
-                    <a:lnTlToBr w="12700" cmpd="sng">
-                      <a:noFill/>
-                      <a:prstDash val="solid"/>
-                    </a:lnTlToBr>
-                    <a:lnBlToTr w="12700" cmpd="sng">
-                      <a:noFill/>
-                      <a:prstDash val="solid"/>
-                    </a:lnBlToTr>
-                    <a:solidFill>
-                      <a:srgbClr val="BFD0EB"/>
-                    </a:solidFill>
-                  </a:tcPr>
-                </a:tc>
-                <a:tc gridSpan="2">
-                  <a:txBody>
-                    <a:bodyPr/>
-                    <a:lstStyle/>
-                    <a:p>
-                      <a:pPr marL="0" marR="0" lvl="0" indent="0" algn="ctr" defTabSz="1554480" rtl="0" eaLnBrk="1" fontAlgn="auto" latinLnBrk="0" hangingPunct="1">
-                        <a:lnSpc>
-                          <a:spcPct val="100000"/>
-                        </a:lnSpc>
-                        <a:spcBef>
-                          <a:spcPts val="0"/>
-                        </a:spcBef>
-                        <a:spcAft>
-                          <a:spcPts val="0"/>
-                        </a:spcAft>
-                        <a:buClrTx/>
-                        <a:buSzTx/>
-                        <a:buFontTx/>
-                        <a:buNone/>
-                        <a:tabLst/>
-                        <a:defRPr/>
-                      </a:pPr>
-                      <a:endParaRPr lang="en-US" sz="1050" dirty="0">
-                        <a:solidFill>
-                          <a:sysClr val="windowText" lastClr="000000"/>
-                        </a:solidFill>
-                        <a:latin typeface="+mn-lt"/>
-                      </a:endParaRPr>
-                    </a:p>
-                  </a:txBody>
-                  <a:tcPr marL="45720" marR="45720" anchor="ctr">
-                    <a:lnL w="12700" cap="flat" cmpd="sng" algn="ctr">
-                      <a:solidFill>
-                        <a:schemeClr val="bg1"/>
-                      </a:solidFill>
-                      <a:prstDash val="solid"/>
-                      <a:round/>
-                      <a:headEnd type="none" w="med" len="med"/>
-                      <a:tailEnd type="none" w="med" len="med"/>
-                    </a:lnL>
-                    <a:lnR w="12700" cap="flat" cmpd="sng" algn="ctr">
-                      <a:solidFill>
-                        <a:schemeClr val="bg1"/>
-                      </a:solidFill>
-                      <a:prstDash val="solid"/>
-                      <a:round/>
-                      <a:headEnd type="none" w="med" len="med"/>
-                      <a:tailEnd type="none" w="med" len="med"/>
-                    </a:lnR>
-                    <a:lnT w="12700" cap="flat" cmpd="sng" algn="ctr">
-                      <a:solidFill>
-                        <a:schemeClr val="bg1"/>
-                      </a:solidFill>
-                      <a:prstDash val="solid"/>
-                      <a:round/>
-                      <a:headEnd type="none" w="med" len="med"/>
-                      <a:tailEnd type="none" w="med" len="med"/>
-                    </a:lnT>
-                    <a:lnB w="12700" cap="flat" cmpd="sng" algn="ctr">
-                      <a:solidFill>
-                        <a:schemeClr val="bg1"/>
-                      </a:solidFill>
-                      <a:prstDash val="solid"/>
-                      <a:round/>
-                      <a:headEnd type="none" w="med" len="med"/>
-                      <a:tailEnd type="none" w="med" len="med"/>
-                    </a:lnB>
-                    <a:lnTlToBr w="12700" cmpd="sng">
-                      <a:noFill/>
-                      <a:prstDash val="solid"/>
-                    </a:lnTlToBr>
-                    <a:lnBlToTr w="12700" cmpd="sng">
-                      <a:noFill/>
-                      <a:prstDash val="solid"/>
-                    </a:lnBlToTr>
-                    <a:solidFill>
-                      <a:srgbClr val="E8EEF8"/>
-                    </a:solidFill>
-                  </a:tcPr>
-                </a:tc>
-                <a:tc hMerge="1">
-                  <a:txBody>
-                    <a:bodyPr/>
-                    <a:lstStyle/>
-                    <a:p>
-                      <a:pPr algn="ctr"/>
-                      <a:endParaRPr lang="en-US" sz="1400" dirty="0">
-                        <a:solidFill>
-                          <a:sysClr val="windowText" lastClr="000000"/>
-                        </a:solidFill>
-                        <a:latin typeface="+mn-lt"/>
-                      </a:endParaRPr>
-                    </a:p>
-                  </a:txBody>
-                  <a:tcPr marL="201168" marR="201168" marT="100584" marB="100584" anchor="ctr"/>
-                </a:tc>
-                <a:tc>
-                  <a:txBody>
-                    <a:bodyPr/>
-                    <a:lstStyle/>
-                    <a:p>
-                      <a:pPr algn="ctr"/>
-                      <a:endParaRPr lang="en-US" sz="1400" dirty="0">
-                        <a:solidFill>
-                          <a:sysClr val="windowText" lastClr="000000"/>
-                        </a:solidFill>
-                        <a:latin typeface="+mn-lt"/>
-                      </a:endParaRPr>
-                    </a:p>
-                  </a:txBody>
-                  <a:tcPr marL="45720" marR="45720" anchor="ctr">
-                    <a:lnL w="12700" cap="flat" cmpd="sng" algn="ctr">
-                      <a:solidFill>
-                        <a:schemeClr val="bg1"/>
-                      </a:solidFill>
-                      <a:prstDash val="solid"/>
-                      <a:round/>
-                      <a:headEnd type="none" w="med" len="med"/>
-                      <a:tailEnd type="none" w="med" len="med"/>
-                    </a:lnL>
-                    <a:lnR w="12700" cap="flat" cmpd="sng" algn="ctr">
-                      <a:solidFill>
-                        <a:schemeClr val="bg1"/>
-                      </a:solidFill>
-                      <a:prstDash val="solid"/>
-                      <a:round/>
-                      <a:headEnd type="none" w="med" len="med"/>
-                      <a:tailEnd type="none" w="med" len="med"/>
-                    </a:lnR>
-                    <a:lnT w="12700" cap="flat" cmpd="sng" algn="ctr">
-                      <a:solidFill>
-                        <a:schemeClr val="bg1"/>
-                      </a:solidFill>
-                      <a:prstDash val="solid"/>
-                      <a:round/>
-                      <a:headEnd type="none" w="med" len="med"/>
-                      <a:tailEnd type="none" w="med" len="med"/>
-                    </a:lnT>
-                    <a:lnB w="12700" cap="flat" cmpd="sng" algn="ctr">
-                      <a:solidFill>
-                        <a:schemeClr val="bg1"/>
-                      </a:solidFill>
-                      <a:prstDash val="solid"/>
-                      <a:round/>
-                      <a:headEnd type="none" w="med" len="med"/>
-                      <a:tailEnd type="none" w="med" len="med"/>
-                    </a:lnB>
-                    <a:lnTlToBr w="12700" cmpd="sng">
-                      <a:noFill/>
-                      <a:prstDash val="solid"/>
-                    </a:lnTlToBr>
-                    <a:lnBlToTr w="12700" cmpd="sng">
-                      <a:noFill/>
-                      <a:prstDash val="solid"/>
-                    </a:lnBlToTr>
-                    <a:solidFill>
-                      <a:srgbClr val="E8EEF8"/>
-                    </a:solidFill>
-                  </a:tcPr>
-                </a:tc>
-                <a:tc>
-                  <a:txBody>
-                    <a:bodyPr/>
-                    <a:lstStyle/>
-                    <a:p>
-                      <a:pPr algn="ctr"/>
-                      <a:endParaRPr lang="en-US" sz="1400" dirty="0">
-                        <a:solidFill>
-                          <a:sysClr val="windowText" lastClr="000000"/>
-                        </a:solidFill>
-                        <a:latin typeface="+mn-lt"/>
-                      </a:endParaRPr>
-                    </a:p>
-                  </a:txBody>
-                  <a:tcPr marL="45720" marR="45720" anchor="ctr">
-                    <a:lnL w="12700" cap="flat" cmpd="sng" algn="ctr">
-                      <a:solidFill>
-                        <a:schemeClr val="bg1"/>
-                      </a:solidFill>
-                      <a:prstDash val="solid"/>
-                      <a:round/>
-                      <a:headEnd type="none" w="med" len="med"/>
-                      <a:tailEnd type="none" w="med" len="med"/>
-                    </a:lnL>
-                    <a:lnR w="12700" cap="flat" cmpd="sng" algn="ctr">
-                      <a:solidFill>
-                        <a:schemeClr val="bg1"/>
-                      </a:solidFill>
-                      <a:prstDash val="solid"/>
-                      <a:round/>
-                      <a:headEnd type="none" w="med" len="med"/>
-                      <a:tailEnd type="none" w="med" len="med"/>
-                    </a:lnR>
-                    <a:lnT w="12700" cap="flat" cmpd="sng" algn="ctr">
-                      <a:solidFill>
-                        <a:schemeClr val="bg1"/>
-                      </a:solidFill>
-                      <a:prstDash val="solid"/>
-                      <a:round/>
-                      <a:headEnd type="none" w="med" len="med"/>
-                      <a:tailEnd type="none" w="med" len="med"/>
-                    </a:lnT>
-                    <a:lnB w="12700" cap="flat" cmpd="sng" algn="ctr">
-                      <a:solidFill>
-                        <a:schemeClr val="bg1"/>
-                      </a:solidFill>
-                      <a:prstDash val="solid"/>
-                      <a:round/>
-                      <a:headEnd type="none" w="med" len="med"/>
-                      <a:tailEnd type="none" w="med" len="med"/>
-                    </a:lnB>
-                    <a:lnTlToBr w="12700" cmpd="sng">
-                      <a:noFill/>
-                      <a:prstDash val="solid"/>
-                    </a:lnTlToBr>
-                    <a:lnBlToTr w="12700" cmpd="sng">
-                      <a:noFill/>
-                      <a:prstDash val="solid"/>
-                    </a:lnBlToTr>
-                    <a:solidFill>
-                      <a:srgbClr val="E8EEF8"/>
-                    </a:solidFill>
-                  </a:tcPr>
-                </a:tc>
-                <a:extLst>
-                  <a:ext uri="{0D108BD9-81ED-4DB2-BD59-A6C34878D82A}">
-                    <a16:rowId xmlns:a16="http://schemas.microsoft.com/office/drawing/2014/main" val="3779271849"/>
-                  </a:ext>
-                </a:extLst>
-              </a:tr>
-              <a:tr h="454025">
-                <a:tc vMerge="1">
-                  <a:txBody>
-                    <a:bodyPr/>
-                    <a:lstStyle/>
-                    <a:p>
-                      <a:pPr algn="ctr"/>
-                      <a:endParaRPr lang="en-US" sz="1400" dirty="0">
-                        <a:solidFill>
-                          <a:sysClr val="windowText" lastClr="000000"/>
-                        </a:solidFill>
-                      </a:endParaRPr>
-                    </a:p>
-                  </a:txBody>
-                  <a:tcPr marL="45720" marR="45720" anchor="ctr">
-                    <a:lnL w="12700" cap="flat" cmpd="sng" algn="ctr">
-                      <a:solidFill>
-                        <a:schemeClr val="bg1"/>
-                      </a:solidFill>
-                      <a:prstDash val="solid"/>
-                      <a:round/>
-                      <a:headEnd type="none" w="med" len="med"/>
-                      <a:tailEnd type="none" w="med" len="med"/>
-                    </a:lnL>
-                    <a:lnR w="12700" cap="flat" cmpd="sng" algn="ctr">
-                      <a:solidFill>
-                        <a:schemeClr val="bg1"/>
-                      </a:solidFill>
-                      <a:prstDash val="solid"/>
-                      <a:round/>
-                      <a:headEnd type="none" w="med" len="med"/>
-                      <a:tailEnd type="none" w="med" len="med"/>
-                    </a:lnR>
-                    <a:lnT w="12700" cap="flat" cmpd="sng" algn="ctr">
-                      <a:solidFill>
-                        <a:schemeClr val="bg1"/>
-                      </a:solidFill>
-                      <a:prstDash val="solid"/>
-                      <a:round/>
-                      <a:headEnd type="none" w="med" len="med"/>
-                      <a:tailEnd type="none" w="med" len="med"/>
-                    </a:lnT>
-                    <a:lnB w="12700" cap="flat" cmpd="sng" algn="ctr">
-                      <a:solidFill>
-                        <a:schemeClr val="bg1"/>
-                      </a:solidFill>
-                      <a:prstDash val="solid"/>
-                      <a:round/>
-                      <a:headEnd type="none" w="med" len="med"/>
-                      <a:tailEnd type="none" w="med" len="med"/>
-                    </a:lnB>
-                    <a:lnTlToBr w="12700" cmpd="sng">
-                      <a:noFill/>
-                      <a:prstDash val="solid"/>
-                    </a:lnTlToBr>
-                    <a:lnBlToTr w="12700" cmpd="sng">
-                      <a:noFill/>
-                      <a:prstDash val="solid"/>
-                    </a:lnBlToTr>
-                    <a:solidFill>
-                      <a:srgbClr val="BFD0EB"/>
-                    </a:solidFill>
-                  </a:tcPr>
-                </a:tc>
-                <a:tc gridSpan="2">
-                  <a:txBody>
-                    <a:bodyPr/>
-                    <a:lstStyle/>
-                    <a:p>
-                      <a:pPr marL="0" marR="0" lvl="0" indent="0" algn="ctr" defTabSz="1554480" rtl="0" eaLnBrk="1" fontAlgn="auto" latinLnBrk="0" hangingPunct="1">
-                        <a:lnSpc>
-                          <a:spcPct val="100000"/>
-                        </a:lnSpc>
-                        <a:spcBef>
-                          <a:spcPts val="0"/>
-                        </a:spcBef>
-                        <a:spcAft>
-                          <a:spcPts val="0"/>
-                        </a:spcAft>
-                        <a:buClrTx/>
-                        <a:buSzTx/>
-                        <a:buFontTx/>
-                        <a:buNone/>
-                        <a:tabLst/>
-                        <a:defRPr/>
-                      </a:pPr>
-                      <a:endParaRPr lang="en-US" sz="1050" dirty="0">
-                        <a:solidFill>
-                          <a:sysClr val="windowText" lastClr="000000"/>
-                        </a:solidFill>
-                        <a:latin typeface="+mn-lt"/>
-                      </a:endParaRPr>
-                    </a:p>
-                  </a:txBody>
-                  <a:tcPr marL="45720" marR="45720" anchor="ctr">
-                    <a:lnL w="12700" cap="flat" cmpd="sng" algn="ctr">
-                      <a:solidFill>
-                        <a:schemeClr val="bg1"/>
-                      </a:solidFill>
-                      <a:prstDash val="solid"/>
-                      <a:round/>
-                      <a:headEnd type="none" w="med" len="med"/>
-                      <a:tailEnd type="none" w="med" len="med"/>
-                    </a:lnL>
-                    <a:lnR w="12700" cap="flat" cmpd="sng" algn="ctr">
-                      <a:solidFill>
-                        <a:schemeClr val="bg1"/>
-                      </a:solidFill>
-                      <a:prstDash val="solid"/>
-                      <a:round/>
-                      <a:headEnd type="none" w="med" len="med"/>
-                      <a:tailEnd type="none" w="med" len="med"/>
-                    </a:lnR>
-                    <a:lnT w="12700" cap="flat" cmpd="sng" algn="ctr">
-                      <a:solidFill>
-                        <a:schemeClr val="bg1"/>
-                      </a:solidFill>
-                      <a:prstDash val="solid"/>
-                      <a:round/>
-                      <a:headEnd type="none" w="med" len="med"/>
-                      <a:tailEnd type="none" w="med" len="med"/>
-                    </a:lnT>
-                    <a:lnB w="12700" cap="flat" cmpd="sng" algn="ctr">
-                      <a:solidFill>
-                        <a:schemeClr val="bg1"/>
-                      </a:solidFill>
-                      <a:prstDash val="solid"/>
-                      <a:round/>
-                      <a:headEnd type="none" w="med" len="med"/>
-                      <a:tailEnd type="none" w="med" len="med"/>
-                    </a:lnB>
-                    <a:lnTlToBr w="12700" cmpd="sng">
-                      <a:noFill/>
-                      <a:prstDash val="solid"/>
-                    </a:lnTlToBr>
-                    <a:lnBlToTr w="12700" cmpd="sng">
-                      <a:noFill/>
-                      <a:prstDash val="solid"/>
-                    </a:lnBlToTr>
-                    <a:solidFill>
-                      <a:srgbClr val="E8EEF8"/>
-                    </a:solidFill>
-                  </a:tcPr>
-                </a:tc>
-                <a:tc hMerge="1">
-                  <a:txBody>
-                    <a:bodyPr/>
-                    <a:lstStyle/>
-                    <a:p>
-                      <a:pPr algn="ctr"/>
-                      <a:endParaRPr lang="en-US" sz="1400" dirty="0">
-                        <a:solidFill>
-                          <a:sysClr val="windowText" lastClr="000000"/>
-                        </a:solidFill>
-                        <a:latin typeface="+mn-lt"/>
-                      </a:endParaRPr>
-                    </a:p>
-                  </a:txBody>
-                  <a:tcPr marL="201168" marR="201168" marT="100584" marB="100584" anchor="ctr"/>
-                </a:tc>
-                <a:tc>
-                  <a:txBody>
-                    <a:bodyPr/>
-                    <a:lstStyle/>
-                    <a:p>
-                      <a:pPr algn="ctr"/>
-                      <a:endParaRPr lang="en-US" sz="1400" dirty="0">
-                        <a:solidFill>
-                          <a:sysClr val="windowText" lastClr="000000"/>
-                        </a:solidFill>
-                        <a:latin typeface="+mn-lt"/>
-                      </a:endParaRPr>
-                    </a:p>
-                  </a:txBody>
-                  <a:tcPr marL="45720" marR="45720" anchor="ctr">
-                    <a:lnL w="12700" cap="flat" cmpd="sng" algn="ctr">
-                      <a:solidFill>
-                        <a:schemeClr val="bg1"/>
-                      </a:solidFill>
-                      <a:prstDash val="solid"/>
-                      <a:round/>
-                      <a:headEnd type="none" w="med" len="med"/>
-                      <a:tailEnd type="none" w="med" len="med"/>
-                    </a:lnL>
-                    <a:lnR w="12700" cap="flat" cmpd="sng" algn="ctr">
-                      <a:solidFill>
-                        <a:schemeClr val="bg1"/>
-                      </a:solidFill>
-                      <a:prstDash val="solid"/>
-                      <a:round/>
-                      <a:headEnd type="none" w="med" len="med"/>
-                      <a:tailEnd type="none" w="med" len="med"/>
-                    </a:lnR>
-                    <a:lnT w="12700" cap="flat" cmpd="sng" algn="ctr">
-                      <a:solidFill>
-                        <a:schemeClr val="bg1"/>
-                      </a:solidFill>
-                      <a:prstDash val="solid"/>
-                      <a:round/>
-                      <a:headEnd type="none" w="med" len="med"/>
-                      <a:tailEnd type="none" w="med" len="med"/>
-                    </a:lnT>
-                    <a:lnB w="12700" cap="flat" cmpd="sng" algn="ctr">
-                      <a:solidFill>
-                        <a:schemeClr val="bg1"/>
-                      </a:solidFill>
-                      <a:prstDash val="solid"/>
-                      <a:round/>
-                      <a:headEnd type="none" w="med" len="med"/>
-                      <a:tailEnd type="none" w="med" len="med"/>
-                    </a:lnB>
-                    <a:lnTlToBr w="12700" cmpd="sng">
-                      <a:noFill/>
-                      <a:prstDash val="solid"/>
-                    </a:lnTlToBr>
-                    <a:lnBlToTr w="12700" cmpd="sng">
-                      <a:noFill/>
-                      <a:prstDash val="solid"/>
-                    </a:lnBlToTr>
-                    <a:solidFill>
-                      <a:srgbClr val="E8EEF8"/>
-                    </a:solidFill>
-                  </a:tcPr>
-                </a:tc>
-                <a:tc>
-                  <a:txBody>
-                    <a:bodyPr/>
-                    <a:lstStyle/>
-                    <a:p>
-                      <a:pPr algn="ctr"/>
-                      <a:endParaRPr lang="en-US" sz="1400" dirty="0">
-                        <a:solidFill>
-                          <a:sysClr val="windowText" lastClr="000000"/>
-                        </a:solidFill>
-                        <a:latin typeface="+mn-lt"/>
-                      </a:endParaRPr>
-                    </a:p>
-                  </a:txBody>
-                  <a:tcPr marL="45720" marR="45720" anchor="ctr">
-                    <a:lnL w="12700" cap="flat" cmpd="sng" algn="ctr">
-                      <a:solidFill>
-                        <a:schemeClr val="bg1"/>
-                      </a:solidFill>
-                      <a:prstDash val="solid"/>
-                      <a:round/>
-                      <a:headEnd type="none" w="med" len="med"/>
-                      <a:tailEnd type="none" w="med" len="med"/>
-                    </a:lnL>
-                    <a:lnR w="12700" cap="flat" cmpd="sng" algn="ctr">
-                      <a:solidFill>
-                        <a:schemeClr val="bg1"/>
-                      </a:solidFill>
-                      <a:prstDash val="solid"/>
-                      <a:round/>
-                      <a:headEnd type="none" w="med" len="med"/>
-                      <a:tailEnd type="none" w="med" len="med"/>
-                    </a:lnR>
-                    <a:lnT w="12700" cap="flat" cmpd="sng" algn="ctr">
-                      <a:solidFill>
-                        <a:schemeClr val="bg1"/>
-                      </a:solidFill>
-                      <a:prstDash val="solid"/>
-                      <a:round/>
-                      <a:headEnd type="none" w="med" len="med"/>
-                      <a:tailEnd type="none" w="med" len="med"/>
-                    </a:lnT>
-                    <a:lnB w="12700" cap="flat" cmpd="sng" algn="ctr">
-                      <a:solidFill>
-                        <a:schemeClr val="bg1"/>
-                      </a:solidFill>
-                      <a:prstDash val="solid"/>
-                      <a:round/>
-                      <a:headEnd type="none" w="med" len="med"/>
-                      <a:tailEnd type="none" w="med" len="med"/>
-                    </a:lnB>
-                    <a:lnTlToBr w="12700" cmpd="sng">
-                      <a:noFill/>
-                      <a:prstDash val="solid"/>
-                    </a:lnTlToBr>
-                    <a:lnBlToTr w="12700" cmpd="sng">
-                      <a:noFill/>
-                      <a:prstDash val="solid"/>
-                    </a:lnBlToTr>
-                    <a:solidFill>
-                      <a:srgbClr val="E8EEF8"/>
-                    </a:solidFill>
-                  </a:tcPr>
-                </a:tc>
-                <a:extLst>
-                  <a:ext uri="{0D108BD9-81ED-4DB2-BD59-A6C34878D82A}">
-                    <a16:rowId xmlns:a16="http://schemas.microsoft.com/office/drawing/2014/main" val="2358869375"/>
-                  </a:ext>
-                </a:extLst>
-              </a:tr>
-              <a:tr h="777180">
-                <a:tc>
-                  <a:txBody>
-                    <a:bodyPr/>
-                    <a:lstStyle/>
-                    <a:p>
-                      <a:pPr algn="ctr"/>
-                      <a:r>
-                        <a:rPr lang="en-US" sz="1400" dirty="0">
-                          <a:solidFill>
-                            <a:sysClr val="windowText" lastClr="000000"/>
-                          </a:solidFill>
-                        </a:rPr>
-                        <a:t>Issues encountered during deployment?</a:t>
-                      </a:r>
-                    </a:p>
-                  </a:txBody>
-                  <a:tcPr marL="45720" marR="45720" anchor="ctr">
-                    <a:lnL w="12700" cap="flat" cmpd="sng" algn="ctr">
-                      <a:solidFill>
-                        <a:schemeClr val="bg1"/>
-                      </a:solidFill>
-                      <a:prstDash val="solid"/>
-                      <a:round/>
-                      <a:headEnd type="none" w="med" len="med"/>
-                      <a:tailEnd type="none" w="med" len="med"/>
-                    </a:lnL>
-                    <a:lnR w="12700" cap="flat" cmpd="sng" algn="ctr">
-                      <a:solidFill>
-                        <a:schemeClr val="bg1"/>
-                      </a:solidFill>
-                      <a:prstDash val="solid"/>
-                      <a:round/>
-                      <a:headEnd type="none" w="med" len="med"/>
-                      <a:tailEnd type="none" w="med" len="med"/>
-                    </a:lnR>
-                    <a:lnT w="12700" cap="flat" cmpd="sng" algn="ctr">
-                      <a:solidFill>
-                        <a:schemeClr val="bg1"/>
-                      </a:solidFill>
-                      <a:prstDash val="solid"/>
-                      <a:round/>
-                      <a:headEnd type="none" w="med" len="med"/>
-                      <a:tailEnd type="none" w="med" len="med"/>
-                    </a:lnT>
-                    <a:lnB w="12700" cap="flat" cmpd="sng" algn="ctr">
-                      <a:solidFill>
-                        <a:schemeClr val="bg1"/>
-                      </a:solidFill>
-                      <a:prstDash val="solid"/>
-                      <a:round/>
-                      <a:headEnd type="none" w="med" len="med"/>
-                      <a:tailEnd type="none" w="med" len="med"/>
-                    </a:lnB>
-                    <a:lnTlToBr w="12700" cmpd="sng">
-                      <a:noFill/>
-                      <a:prstDash val="solid"/>
-                    </a:lnTlToBr>
-                    <a:lnBlToTr w="12700" cmpd="sng">
-                      <a:noFill/>
-                      <a:prstDash val="solid"/>
-                    </a:lnBlToTr>
-                    <a:solidFill>
-                      <a:srgbClr val="BFD0EB"/>
-                    </a:solidFill>
-                  </a:tcPr>
-                </a:tc>
-                <a:tc>
-                  <a:txBody>
-                    <a:bodyPr/>
-                    <a:lstStyle/>
-                    <a:p>
-                      <a:pPr marL="0" marR="0" lvl="0" indent="0" algn="ctr" defTabSz="1554480" rtl="0" eaLnBrk="1" fontAlgn="auto" latinLnBrk="0" hangingPunct="1">
-                        <a:lnSpc>
-                          <a:spcPct val="100000"/>
-                        </a:lnSpc>
-                        <a:spcBef>
-                          <a:spcPts val="0"/>
-                        </a:spcBef>
-                        <a:spcAft>
-                          <a:spcPts val="0"/>
-                        </a:spcAft>
-                        <a:buClrTx/>
-                        <a:buSzTx/>
-                        <a:buFontTx/>
-                        <a:buNone/>
-                        <a:tabLst/>
-                        <a:defRPr/>
-                      </a:pPr>
-                      <a:r>
-                        <a:rPr lang="en-US" sz="1600" dirty="0">
-                          <a:solidFill>
-                            <a:schemeClr val="tx1"/>
-                          </a:solidFill>
-                          <a:sym typeface="Wingdings" panose="05000000000000000000" pitchFamily="2" charset="2"/>
-                        </a:rPr>
-                        <a:t></a:t>
-                      </a:r>
-                      <a:endParaRPr lang="en-US" sz="1600" dirty="0">
-                        <a:solidFill>
-                          <a:schemeClr val="tx1"/>
-                        </a:solidFill>
-                      </a:endParaRPr>
-                    </a:p>
-                  </a:txBody>
-                  <a:tcPr marL="45720" marR="45720" anchor="ctr">
-                    <a:lnL w="12700" cap="flat" cmpd="sng" algn="ctr">
-                      <a:solidFill>
-                        <a:schemeClr val="bg1"/>
-                      </a:solidFill>
-                      <a:prstDash val="solid"/>
-                      <a:round/>
-                      <a:headEnd type="none" w="med" len="med"/>
-                      <a:tailEnd type="none" w="med" len="med"/>
-                    </a:lnL>
-                    <a:lnR w="12700" cap="flat" cmpd="sng" algn="ctr">
-                      <a:solidFill>
-                        <a:schemeClr val="bg1"/>
-                      </a:solidFill>
-                      <a:prstDash val="solid"/>
-                      <a:round/>
-                      <a:headEnd type="none" w="med" len="med"/>
-                      <a:tailEnd type="none" w="med" len="med"/>
-                    </a:lnR>
-                    <a:lnT w="12700" cap="flat" cmpd="sng" algn="ctr">
-                      <a:solidFill>
-                        <a:schemeClr val="bg1"/>
-                      </a:solidFill>
-                      <a:prstDash val="solid"/>
-                      <a:round/>
-                      <a:headEnd type="none" w="med" len="med"/>
-                      <a:tailEnd type="none" w="med" len="med"/>
-                    </a:lnT>
-                    <a:lnB w="12700" cap="flat" cmpd="sng" algn="ctr">
-                      <a:solidFill>
-                        <a:schemeClr val="bg1"/>
-                      </a:solidFill>
-                      <a:prstDash val="solid"/>
-                      <a:round/>
-                      <a:headEnd type="none" w="med" len="med"/>
-                      <a:tailEnd type="none" w="med" len="med"/>
-                    </a:lnB>
-                    <a:lnTlToBr w="12700" cmpd="sng">
-                      <a:noFill/>
-                      <a:prstDash val="solid"/>
-                    </a:lnTlToBr>
-                    <a:lnBlToTr w="12700" cmpd="sng">
-                      <a:noFill/>
-                      <a:prstDash val="solid"/>
-                    </a:lnBlToTr>
-                    <a:solidFill>
-                      <a:srgbClr val="E8EEF8"/>
-                    </a:solidFill>
-                  </a:tcPr>
-                </a:tc>
-                <a:tc gridSpan="3">
-                  <a:txBody>
-                    <a:bodyPr/>
-                    <a:lstStyle/>
-                    <a:p>
-                      <a:pPr algn="ctr"/>
-                      <a:r>
-                        <a:rPr lang="en-US" sz="1400" dirty="0">
-                          <a:solidFill>
-                            <a:sysClr val="windowText" lastClr="000000"/>
-                          </a:solidFill>
-                          <a:latin typeface="+mn-lt"/>
-                        </a:rPr>
-                        <a:t>Brief summary of issues</a:t>
-                      </a:r>
-                      <a:endParaRPr lang="en-US" dirty="0"/>
-                    </a:p>
-                  </a:txBody>
-                  <a:tcPr marL="45720" marR="45720" anchor="ctr">
-                    <a:lnL w="12700" cap="flat" cmpd="sng" algn="ctr">
-                      <a:solidFill>
-                        <a:schemeClr val="bg1"/>
-                      </a:solidFill>
-                      <a:prstDash val="solid"/>
-                      <a:round/>
-                      <a:headEnd type="none" w="med" len="med"/>
-                      <a:tailEnd type="none" w="med" len="med"/>
-                    </a:lnL>
-                    <a:lnR w="12700" cap="flat" cmpd="sng" algn="ctr">
-                      <a:solidFill>
-                        <a:schemeClr val="bg1"/>
-                      </a:solidFill>
-                      <a:prstDash val="solid"/>
-                      <a:round/>
-                      <a:headEnd type="none" w="med" len="med"/>
-                      <a:tailEnd type="none" w="med" len="med"/>
-                    </a:lnR>
-                    <a:lnT w="12700" cap="flat" cmpd="sng" algn="ctr">
-                      <a:solidFill>
-                        <a:schemeClr val="bg1"/>
-                      </a:solidFill>
-                      <a:prstDash val="solid"/>
-                      <a:round/>
-                      <a:headEnd type="none" w="med" len="med"/>
-                      <a:tailEnd type="none" w="med" len="med"/>
-                    </a:lnT>
-                    <a:lnB w="12700" cap="flat" cmpd="sng" algn="ctr">
-                      <a:solidFill>
-                        <a:schemeClr val="bg1"/>
-                      </a:solidFill>
-                      <a:prstDash val="solid"/>
-                      <a:round/>
-                      <a:headEnd type="none" w="med" len="med"/>
-                      <a:tailEnd type="none" w="med" len="med"/>
-                    </a:lnB>
-                    <a:lnTlToBr w="12700" cmpd="sng">
-                      <a:noFill/>
-                      <a:prstDash val="solid"/>
-                    </a:lnTlToBr>
-                    <a:lnBlToTr w="12700" cmpd="sng">
-                      <a:noFill/>
-                      <a:prstDash val="solid"/>
-                    </a:lnBlToTr>
-                    <a:solidFill>
-                      <a:srgbClr val="E8EEF8"/>
-                    </a:solidFill>
-                  </a:tcPr>
-                </a:tc>
-                <a:tc hMerge="1">
-                  <a:txBody>
-                    <a:bodyPr/>
-                    <a:lstStyle/>
-                    <a:p>
-                      <a:pPr algn="ctr"/>
-                      <a:endParaRPr lang="en-US" sz="1400" dirty="0">
-                        <a:solidFill>
-                          <a:sysClr val="windowText" lastClr="000000"/>
-                        </a:solidFill>
-                        <a:latin typeface="+mn-lt"/>
-                      </a:endParaRPr>
-                    </a:p>
-                  </a:txBody>
-                  <a:tcPr marL="201168" marR="201168" marT="100584" marB="100584" anchor="ctr">
-                    <a:lnL w="12700" cap="flat" cmpd="sng" algn="ctr">
-                      <a:solidFill>
-                        <a:schemeClr val="bg1"/>
-                      </a:solidFill>
-                      <a:prstDash val="solid"/>
-                      <a:round/>
-                      <a:headEnd type="none" w="med" len="med"/>
-                      <a:tailEnd type="none" w="med" len="med"/>
-                    </a:lnL>
-                    <a:lnR w="12700" cap="flat" cmpd="sng" algn="ctr">
-                      <a:solidFill>
-                        <a:schemeClr val="bg1"/>
-                      </a:solidFill>
-                      <a:prstDash val="solid"/>
-                      <a:round/>
-                      <a:headEnd type="none" w="med" len="med"/>
-                      <a:tailEnd type="none" w="med" len="med"/>
-                    </a:lnR>
-                    <a:lnT w="12700" cap="flat" cmpd="sng" algn="ctr">
-                      <a:solidFill>
-                        <a:schemeClr val="bg1"/>
-                      </a:solidFill>
-                      <a:prstDash val="solid"/>
-                      <a:round/>
-                      <a:headEnd type="none" w="med" len="med"/>
-                      <a:tailEnd type="none" w="med" len="med"/>
-                    </a:lnT>
-                    <a:lnB w="12700" cap="flat" cmpd="sng" algn="ctr">
-                      <a:solidFill>
-                        <a:schemeClr val="bg1"/>
-                      </a:solidFill>
-                      <a:prstDash val="solid"/>
-                      <a:round/>
-                      <a:headEnd type="none" w="med" len="med"/>
-                      <a:tailEnd type="none" w="med" len="med"/>
-                    </a:lnB>
-                    <a:lnTlToBr w="12700" cmpd="sng">
-                      <a:noFill/>
-                      <a:prstDash val="solid"/>
-                    </a:lnTlToBr>
-                    <a:lnBlToTr w="12700" cmpd="sng">
-                      <a:noFill/>
-                      <a:prstDash val="solid"/>
-                    </a:lnBlToTr>
-                    <a:solidFill>
-                      <a:srgbClr val="E8EEF8"/>
-                    </a:solidFill>
-                  </a:tcPr>
-                </a:tc>
-                <a:tc hMerge="1">
-                  <a:txBody>
-                    <a:bodyPr/>
-                    <a:lstStyle/>
-                    <a:p>
-                      <a:pPr algn="ctr"/>
-                      <a:endParaRPr lang="en-US" sz="1400" dirty="0">
-                        <a:solidFill>
-                          <a:sysClr val="windowText" lastClr="000000"/>
-                        </a:solidFill>
-                        <a:latin typeface="+mn-lt"/>
-                      </a:endParaRPr>
-                    </a:p>
-                  </a:txBody>
-                  <a:tcPr marL="201168" marR="201168" marT="100584" marB="100584" anchor="ctr">
-                    <a:lnL w="12700" cap="flat" cmpd="sng" algn="ctr">
-                      <a:solidFill>
-                        <a:schemeClr val="bg1"/>
-                      </a:solidFill>
-                      <a:prstDash val="solid"/>
-                      <a:round/>
-                      <a:headEnd type="none" w="med" len="med"/>
-                      <a:tailEnd type="none" w="med" len="med"/>
-                    </a:lnL>
-                    <a:lnR w="12700" cap="flat" cmpd="sng" algn="ctr">
-                      <a:solidFill>
-                        <a:schemeClr val="bg1"/>
-                      </a:solidFill>
-                      <a:prstDash val="solid"/>
-                      <a:round/>
-                      <a:headEnd type="none" w="med" len="med"/>
-                      <a:tailEnd type="none" w="med" len="med"/>
-                    </a:lnR>
-                    <a:lnT w="12700" cap="flat" cmpd="sng" algn="ctr">
-                      <a:solidFill>
-                        <a:schemeClr val="bg1"/>
-                      </a:solidFill>
-                      <a:prstDash val="solid"/>
-                      <a:round/>
-                      <a:headEnd type="none" w="med" len="med"/>
-                      <a:tailEnd type="none" w="med" len="med"/>
-                    </a:lnT>
-                    <a:lnB w="12700" cap="flat" cmpd="sng" algn="ctr">
-                      <a:solidFill>
-                        <a:schemeClr val="bg1"/>
-                      </a:solidFill>
-                      <a:prstDash val="solid"/>
-                      <a:round/>
-                      <a:headEnd type="none" w="med" len="med"/>
-                      <a:tailEnd type="none" w="med" len="med"/>
-                    </a:lnB>
-                    <a:lnTlToBr w="12700" cmpd="sng">
-                      <a:noFill/>
-                      <a:prstDash val="solid"/>
-                    </a:lnTlToBr>
-                    <a:lnBlToTr w="12700" cmpd="sng">
-                      <a:noFill/>
-                      <a:prstDash val="solid"/>
-                    </a:lnBlToTr>
-                    <a:solidFill>
-                      <a:srgbClr val="E8EEF8"/>
-                    </a:solidFill>
-                  </a:tcPr>
-                </a:tc>
-                <a:extLst>
-                  <a:ext uri="{0D108BD9-81ED-4DB2-BD59-A6C34878D82A}">
-                    <a16:rowId xmlns:a16="http://schemas.microsoft.com/office/drawing/2014/main" val="78851090"/>
-                  </a:ext>
-                </a:extLst>
-              </a:tr>
-            </a:tbl>
-          </a:graphicData>
-        </a:graphic>
-      </p:graphicFrame>
       <p:cxnSp>
         <p:nvCxnSpPr>
           <p:cNvPr id="38" name="Straight Connector 37">
@@ -10320,6 +8233,1942 @@
           </a:p>
         </p:txBody>
       </p:sp>
+      <p:graphicFrame>
+        <p:nvGraphicFramePr>
+          <p:cNvPr id="34" name="Table 18">
+            <a:extLst>
+              <a:ext uri="{FF2B5EF4-FFF2-40B4-BE49-F238E27FC236}">
+                <a16:creationId xmlns:a16="http://schemas.microsoft.com/office/drawing/2014/main" id="{D0B531C8-60C2-48F9-BB0F-5A2C4BDD52AD}"/>
+              </a:ext>
+            </a:extLst>
+          </p:cNvPr>
+          <p:cNvGraphicFramePr>
+            <a:graphicFrameLocks noGrp="1"/>
+          </p:cNvGraphicFramePr>
+          <p:nvPr>
+            <p:extLst>
+              <p:ext uri="{D42A27DB-BD31-4B8C-83A1-F6EECF244321}">
+                <p14:modId xmlns:p14="http://schemas.microsoft.com/office/powerpoint/2010/main" val="3286520344"/>
+              </p:ext>
+            </p:extLst>
+          </p:nvPr>
+        </p:nvGraphicFramePr>
+        <p:xfrm>
+          <a:off x="5524957" y="2883432"/>
+          <a:ext cx="4448804" cy="4123943"/>
+        </p:xfrm>
+        <a:graphic>
+          <a:graphicData uri="http://schemas.openxmlformats.org/drawingml/2006/table">
+            <a:tbl>
+              <a:tblPr firstRow="1" bandRow="1">
+                <a:tableStyleId>{69CF1AB2-1976-4502-BF36-3FF5EA218861}</a:tableStyleId>
+              </a:tblPr>
+              <a:tblGrid>
+                <a:gridCol w="1736844">
+                  <a:extLst>
+                    <a:ext uri="{9D8B030D-6E8A-4147-A177-3AD203B41FA5}">
+                      <a16:colId xmlns:a16="http://schemas.microsoft.com/office/drawing/2014/main" val="3814208030"/>
+                    </a:ext>
+                  </a:extLst>
+                </a:gridCol>
+                <a:gridCol w="855028">
+                  <a:extLst>
+                    <a:ext uri="{9D8B030D-6E8A-4147-A177-3AD203B41FA5}">
+                      <a16:colId xmlns:a16="http://schemas.microsoft.com/office/drawing/2014/main" val="1546040442"/>
+                    </a:ext>
+                  </a:extLst>
+                </a:gridCol>
+                <a:gridCol w="928466">
+                  <a:extLst>
+                    <a:ext uri="{9D8B030D-6E8A-4147-A177-3AD203B41FA5}">
+                      <a16:colId xmlns:a16="http://schemas.microsoft.com/office/drawing/2014/main" val="1911725581"/>
+                    </a:ext>
+                  </a:extLst>
+                </a:gridCol>
+                <a:gridCol w="928466">
+                  <a:extLst>
+                    <a:ext uri="{9D8B030D-6E8A-4147-A177-3AD203B41FA5}">
+                      <a16:colId xmlns:a16="http://schemas.microsoft.com/office/drawing/2014/main" val="1354556242"/>
+                    </a:ext>
+                  </a:extLst>
+                </a:gridCol>
+              </a:tblGrid>
+              <a:tr h="448675">
+                <a:tc gridSpan="4">
+                  <a:txBody>
+                    <a:bodyPr/>
+                    <a:lstStyle/>
+                    <a:p>
+                      <a:pPr algn="ctr"/>
+                      <a:r>
+                        <a:rPr lang="en-US" sz="1400" b="1" dirty="0">
+                          <a:solidFill>
+                            <a:sysClr val="windowText" lastClr="000000"/>
+                          </a:solidFill>
+                          <a:latin typeface="+mn-lt"/>
+                        </a:rPr>
+                        <a:t>Sensor Information</a:t>
+                      </a:r>
+                    </a:p>
+                  </a:txBody>
+                  <a:tcPr marL="201168" marR="201168" marT="100584" marB="100584" anchor="ctr">
+                    <a:lnL w="12700" cap="flat" cmpd="sng" algn="ctr">
+                      <a:solidFill>
+                        <a:schemeClr val="bg1"/>
+                      </a:solidFill>
+                      <a:prstDash val="solid"/>
+                      <a:round/>
+                      <a:headEnd type="none" w="med" len="med"/>
+                      <a:tailEnd type="none" w="med" len="med"/>
+                    </a:lnL>
+                    <a:lnR w="12700" cap="flat" cmpd="sng" algn="ctr">
+                      <a:solidFill>
+                        <a:schemeClr val="bg1"/>
+                      </a:solidFill>
+                      <a:prstDash val="solid"/>
+                      <a:round/>
+                      <a:headEnd type="none" w="med" len="med"/>
+                      <a:tailEnd type="none" w="med" len="med"/>
+                    </a:lnR>
+                    <a:lnT w="12700" cap="flat" cmpd="sng" algn="ctr">
+                      <a:solidFill>
+                        <a:schemeClr val="bg1"/>
+                      </a:solidFill>
+                      <a:prstDash val="solid"/>
+                      <a:round/>
+                      <a:headEnd type="none" w="med" len="med"/>
+                      <a:tailEnd type="none" w="med" len="med"/>
+                    </a:lnT>
+                    <a:lnB w="12700" cap="flat" cmpd="sng" algn="ctr">
+                      <a:solidFill>
+                        <a:schemeClr val="bg1"/>
+                      </a:solidFill>
+                      <a:prstDash val="solid"/>
+                      <a:round/>
+                      <a:headEnd type="none" w="med" len="med"/>
+                      <a:tailEnd type="none" w="med" len="med"/>
+                    </a:lnB>
+                    <a:lnTlToBr w="12700" cmpd="sng">
+                      <a:noFill/>
+                      <a:prstDash val="solid"/>
+                    </a:lnTlToBr>
+                    <a:lnBlToTr w="12700" cmpd="sng">
+                      <a:noFill/>
+                      <a:prstDash val="solid"/>
+                    </a:lnBlToTr>
+                    <a:solidFill>
+                      <a:srgbClr val="BFD0EB"/>
+                    </a:solidFill>
+                  </a:tcPr>
+                </a:tc>
+                <a:tc hMerge="1">
+                  <a:txBody>
+                    <a:bodyPr/>
+                    <a:lstStyle/>
+                    <a:p>
+                      <a:pPr algn="ctr"/>
+                      <a:endParaRPr lang="en-US" sz="1400" dirty="0">
+                        <a:solidFill>
+                          <a:sysClr val="windowText" lastClr="000000"/>
+                        </a:solidFill>
+                        <a:latin typeface="+mn-lt"/>
+                      </a:endParaRPr>
+                    </a:p>
+                  </a:txBody>
+                  <a:tcPr marL="201168" marR="201168" marT="100584" marB="100584" anchor="ctr">
+                    <a:lnL w="12700" cap="flat" cmpd="sng" algn="ctr">
+                      <a:solidFill>
+                        <a:schemeClr val="bg1"/>
+                      </a:solidFill>
+                      <a:prstDash val="solid"/>
+                      <a:round/>
+                      <a:headEnd type="none" w="med" len="med"/>
+                      <a:tailEnd type="none" w="med" len="med"/>
+                    </a:lnL>
+                    <a:lnR w="12700" cap="flat" cmpd="sng" algn="ctr">
+                      <a:solidFill>
+                        <a:schemeClr val="bg1"/>
+                      </a:solidFill>
+                      <a:prstDash val="solid"/>
+                      <a:round/>
+                      <a:headEnd type="none" w="med" len="med"/>
+                      <a:tailEnd type="none" w="med" len="med"/>
+                    </a:lnR>
+                    <a:lnT w="12700" cap="flat" cmpd="sng" algn="ctr">
+                      <a:solidFill>
+                        <a:schemeClr val="bg1"/>
+                      </a:solidFill>
+                      <a:prstDash val="solid"/>
+                      <a:round/>
+                      <a:headEnd type="none" w="med" len="med"/>
+                      <a:tailEnd type="none" w="med" len="med"/>
+                    </a:lnT>
+                    <a:lnB w="12700" cap="flat" cmpd="sng" algn="ctr">
+                      <a:solidFill>
+                        <a:schemeClr val="bg1"/>
+                      </a:solidFill>
+                      <a:prstDash val="solid"/>
+                      <a:round/>
+                      <a:headEnd type="none" w="med" len="med"/>
+                      <a:tailEnd type="none" w="med" len="med"/>
+                    </a:lnB>
+                    <a:lnTlToBr w="12700" cmpd="sng">
+                      <a:noFill/>
+                      <a:prstDash val="solid"/>
+                    </a:lnTlToBr>
+                    <a:lnBlToTr w="12700" cmpd="sng">
+                      <a:noFill/>
+                      <a:prstDash val="solid"/>
+                    </a:lnBlToTr>
+                    <a:solidFill>
+                      <a:srgbClr val="E8EEF8"/>
+                    </a:solidFill>
+                  </a:tcPr>
+                </a:tc>
+                <a:tc hMerge="1">
+                  <a:txBody>
+                    <a:bodyPr/>
+                    <a:lstStyle/>
+                    <a:p>
+                      <a:endParaRPr lang="en-US"/>
+                    </a:p>
+                  </a:txBody>
+                  <a:tcPr>
+                    <a:lnL w="12700" cap="flat" cmpd="sng" algn="ctr">
+                      <a:solidFill>
+                        <a:schemeClr val="bg1"/>
+                      </a:solidFill>
+                      <a:prstDash val="solid"/>
+                      <a:round/>
+                      <a:headEnd type="none" w="med" len="med"/>
+                      <a:tailEnd type="none" w="med" len="med"/>
+                    </a:lnL>
+                  </a:tcPr>
+                </a:tc>
+                <a:tc hMerge="1">
+                  <a:txBody>
+                    <a:bodyPr/>
+                    <a:lstStyle/>
+                    <a:p>
+                      <a:endParaRPr lang="en-US"/>
+                    </a:p>
+                  </a:txBody>
+                  <a:tcPr>
+                    <a:lnL w="12700" cap="flat" cmpd="sng" algn="ctr">
+                      <a:solidFill>
+                        <a:schemeClr val="bg1"/>
+                      </a:solidFill>
+                      <a:prstDash val="solid"/>
+                      <a:round/>
+                      <a:headEnd type="none" w="med" len="med"/>
+                      <a:tailEnd type="none" w="med" len="med"/>
+                    </a:lnL>
+                  </a:tcPr>
+                </a:tc>
+                <a:extLst>
+                  <a:ext uri="{0D108BD9-81ED-4DB2-BD59-A6C34878D82A}">
+                    <a16:rowId xmlns:a16="http://schemas.microsoft.com/office/drawing/2014/main" val="2801822641"/>
+                  </a:ext>
+                </a:extLst>
+              </a:tr>
+              <a:tr h="488321">
+                <a:tc>
+                  <a:txBody>
+                    <a:bodyPr/>
+                    <a:lstStyle/>
+                    <a:p>
+                      <a:pPr algn="ctr"/>
+                      <a:r>
+                        <a:rPr lang="en-US" sz="1400" b="0" dirty="0">
+                          <a:solidFill>
+                            <a:sysClr val="windowText" lastClr="000000"/>
+                          </a:solidFill>
+                        </a:rPr>
+                        <a:t>Manufacturer, model</a:t>
+                      </a:r>
+                    </a:p>
+                  </a:txBody>
+                  <a:tcPr marL="45720" marR="45720" anchor="ctr">
+                    <a:lnL w="12700" cap="flat" cmpd="sng" algn="ctr">
+                      <a:solidFill>
+                        <a:schemeClr val="bg1"/>
+                      </a:solidFill>
+                      <a:prstDash val="solid"/>
+                      <a:round/>
+                      <a:headEnd type="none" w="med" len="med"/>
+                      <a:tailEnd type="none" w="med" len="med"/>
+                    </a:lnL>
+                    <a:lnR w="12700" cap="flat" cmpd="sng" algn="ctr">
+                      <a:solidFill>
+                        <a:schemeClr val="bg1"/>
+                      </a:solidFill>
+                      <a:prstDash val="solid"/>
+                      <a:round/>
+                      <a:headEnd type="none" w="med" len="med"/>
+                      <a:tailEnd type="none" w="med" len="med"/>
+                    </a:lnR>
+                    <a:lnT w="12700" cap="flat" cmpd="sng" algn="ctr">
+                      <a:solidFill>
+                        <a:schemeClr val="bg1"/>
+                      </a:solidFill>
+                      <a:prstDash val="solid"/>
+                      <a:round/>
+                      <a:headEnd type="none" w="med" len="med"/>
+                      <a:tailEnd type="none" w="med" len="med"/>
+                    </a:lnT>
+                    <a:lnB w="12700" cap="flat" cmpd="sng" algn="ctr">
+                      <a:solidFill>
+                        <a:schemeClr val="bg1"/>
+                      </a:solidFill>
+                      <a:prstDash val="solid"/>
+                      <a:round/>
+                      <a:headEnd type="none" w="med" len="med"/>
+                      <a:tailEnd type="none" w="med" len="med"/>
+                    </a:lnB>
+                    <a:lnTlToBr w="12700" cmpd="sng">
+                      <a:noFill/>
+                      <a:prstDash val="solid"/>
+                    </a:lnTlToBr>
+                    <a:lnBlToTr w="12700" cmpd="sng">
+                      <a:noFill/>
+                      <a:prstDash val="solid"/>
+                    </a:lnBlToTr>
+                    <a:solidFill>
+                      <a:srgbClr val="BFD0EB"/>
+                    </a:solidFill>
+                  </a:tcPr>
+                </a:tc>
+                <a:tc gridSpan="3">
+                  <a:txBody>
+                    <a:bodyPr/>
+                    <a:lstStyle/>
+                    <a:p>
+                      <a:pPr algn="ctr"/>
+                      <a:endParaRPr lang="en-US" sz="1400" dirty="0">
+                        <a:solidFill>
+                          <a:sysClr val="windowText" lastClr="000000"/>
+                        </a:solidFill>
+                        <a:latin typeface="+mn-lt"/>
+                      </a:endParaRPr>
+                    </a:p>
+                  </a:txBody>
+                  <a:tcPr marL="45720" marR="45720" anchor="ctr">
+                    <a:lnL w="12700" cap="flat" cmpd="sng" algn="ctr">
+                      <a:solidFill>
+                        <a:schemeClr val="bg1"/>
+                      </a:solidFill>
+                      <a:prstDash val="solid"/>
+                      <a:round/>
+                      <a:headEnd type="none" w="med" len="med"/>
+                      <a:tailEnd type="none" w="med" len="med"/>
+                    </a:lnL>
+                    <a:lnR w="12700" cap="flat" cmpd="sng" algn="ctr">
+                      <a:solidFill>
+                        <a:schemeClr val="bg1"/>
+                      </a:solidFill>
+                      <a:prstDash val="solid"/>
+                      <a:round/>
+                      <a:headEnd type="none" w="med" len="med"/>
+                      <a:tailEnd type="none" w="med" len="med"/>
+                    </a:lnR>
+                    <a:lnT w="12700" cap="flat" cmpd="sng" algn="ctr">
+                      <a:solidFill>
+                        <a:schemeClr val="bg1"/>
+                      </a:solidFill>
+                      <a:prstDash val="solid"/>
+                      <a:round/>
+                      <a:headEnd type="none" w="med" len="med"/>
+                      <a:tailEnd type="none" w="med" len="med"/>
+                    </a:lnT>
+                    <a:lnB w="12700" cap="flat" cmpd="sng" algn="ctr">
+                      <a:solidFill>
+                        <a:schemeClr val="bg1"/>
+                      </a:solidFill>
+                      <a:prstDash val="solid"/>
+                      <a:round/>
+                      <a:headEnd type="none" w="med" len="med"/>
+                      <a:tailEnd type="none" w="med" len="med"/>
+                    </a:lnB>
+                    <a:lnTlToBr w="12700" cmpd="sng">
+                      <a:noFill/>
+                      <a:prstDash val="solid"/>
+                    </a:lnTlToBr>
+                    <a:lnBlToTr w="12700" cmpd="sng">
+                      <a:noFill/>
+                      <a:prstDash val="solid"/>
+                    </a:lnBlToTr>
+                    <a:solidFill>
+                      <a:srgbClr val="E8EEF8"/>
+                    </a:solidFill>
+                  </a:tcPr>
+                </a:tc>
+                <a:tc hMerge="1">
+                  <a:txBody>
+                    <a:bodyPr/>
+                    <a:lstStyle/>
+                    <a:p>
+                      <a:endParaRPr lang="en-US"/>
+                    </a:p>
+                  </a:txBody>
+                  <a:tcPr>
+                    <a:lnL w="12700" cap="flat" cmpd="sng" algn="ctr">
+                      <a:solidFill>
+                        <a:schemeClr val="bg1"/>
+                      </a:solidFill>
+                      <a:prstDash val="solid"/>
+                      <a:round/>
+                      <a:headEnd type="none" w="med" len="med"/>
+                      <a:tailEnd type="none" w="med" len="med"/>
+                    </a:lnL>
+                  </a:tcPr>
+                </a:tc>
+                <a:tc hMerge="1">
+                  <a:txBody>
+                    <a:bodyPr/>
+                    <a:lstStyle/>
+                    <a:p>
+                      <a:endParaRPr lang="en-US"/>
+                    </a:p>
+                  </a:txBody>
+                  <a:tcPr>
+                    <a:lnL w="12700" cap="flat" cmpd="sng" algn="ctr">
+                      <a:solidFill>
+                        <a:schemeClr val="bg1"/>
+                      </a:solidFill>
+                      <a:prstDash val="solid"/>
+                      <a:round/>
+                      <a:headEnd type="none" w="med" len="med"/>
+                      <a:tailEnd type="none" w="med" len="med"/>
+                    </a:lnL>
+                  </a:tcPr>
+                </a:tc>
+                <a:extLst>
+                  <a:ext uri="{0D108BD9-81ED-4DB2-BD59-A6C34878D82A}">
+                    <a16:rowId xmlns:a16="http://schemas.microsoft.com/office/drawing/2014/main" val="1499110780"/>
+                  </a:ext>
+                </a:extLst>
+              </a:tr>
+              <a:tr h="523846">
+                <a:tc>
+                  <a:txBody>
+                    <a:bodyPr/>
+                    <a:lstStyle/>
+                    <a:p>
+                      <a:pPr algn="ctr"/>
+                      <a:r>
+                        <a:rPr lang="en-US" sz="1400" b="0" dirty="0">
+                          <a:solidFill>
+                            <a:sysClr val="windowText" lastClr="000000"/>
+                          </a:solidFill>
+                        </a:rPr>
+                        <a:t>Device firmware version</a:t>
+                      </a:r>
+                    </a:p>
+                  </a:txBody>
+                  <a:tcPr marL="45720" marR="45720" anchor="ctr">
+                    <a:lnL w="12700" cap="flat" cmpd="sng" algn="ctr">
+                      <a:solidFill>
+                        <a:schemeClr val="bg1"/>
+                      </a:solidFill>
+                      <a:prstDash val="solid"/>
+                      <a:round/>
+                      <a:headEnd type="none" w="med" len="med"/>
+                      <a:tailEnd type="none" w="med" len="med"/>
+                    </a:lnL>
+                    <a:lnR w="12700" cap="flat" cmpd="sng" algn="ctr">
+                      <a:solidFill>
+                        <a:schemeClr val="bg1"/>
+                      </a:solidFill>
+                      <a:prstDash val="solid"/>
+                      <a:round/>
+                      <a:headEnd type="none" w="med" len="med"/>
+                      <a:tailEnd type="none" w="med" len="med"/>
+                    </a:lnR>
+                    <a:lnT w="12700" cap="flat" cmpd="sng" algn="ctr">
+                      <a:solidFill>
+                        <a:schemeClr val="bg1"/>
+                      </a:solidFill>
+                      <a:prstDash val="solid"/>
+                      <a:round/>
+                      <a:headEnd type="none" w="med" len="med"/>
+                      <a:tailEnd type="none" w="med" len="med"/>
+                    </a:lnT>
+                    <a:lnB w="12700" cap="flat" cmpd="sng" algn="ctr">
+                      <a:solidFill>
+                        <a:schemeClr val="bg1"/>
+                      </a:solidFill>
+                      <a:prstDash val="solid"/>
+                      <a:round/>
+                      <a:headEnd type="none" w="med" len="med"/>
+                      <a:tailEnd type="none" w="med" len="med"/>
+                    </a:lnB>
+                    <a:lnTlToBr w="12700" cmpd="sng">
+                      <a:noFill/>
+                      <a:prstDash val="solid"/>
+                    </a:lnTlToBr>
+                    <a:lnBlToTr w="12700" cmpd="sng">
+                      <a:noFill/>
+                      <a:prstDash val="solid"/>
+                    </a:lnBlToTr>
+                    <a:solidFill>
+                      <a:srgbClr val="BFD0EB"/>
+                    </a:solidFill>
+                  </a:tcPr>
+                </a:tc>
+                <a:tc gridSpan="3">
+                  <a:txBody>
+                    <a:bodyPr/>
+                    <a:lstStyle/>
+                    <a:p>
+                      <a:pPr algn="ctr"/>
+                      <a:endParaRPr lang="en-US" sz="1400" dirty="0">
+                        <a:solidFill>
+                          <a:sysClr val="windowText" lastClr="000000"/>
+                        </a:solidFill>
+                        <a:latin typeface="+mn-lt"/>
+                      </a:endParaRPr>
+                    </a:p>
+                  </a:txBody>
+                  <a:tcPr marL="45720" marR="45720" anchor="ctr">
+                    <a:lnL w="12700" cap="flat" cmpd="sng" algn="ctr">
+                      <a:solidFill>
+                        <a:schemeClr val="bg1"/>
+                      </a:solidFill>
+                      <a:prstDash val="solid"/>
+                      <a:round/>
+                      <a:headEnd type="none" w="med" len="med"/>
+                      <a:tailEnd type="none" w="med" len="med"/>
+                    </a:lnL>
+                    <a:lnR w="12700" cap="flat" cmpd="sng" algn="ctr">
+                      <a:solidFill>
+                        <a:schemeClr val="bg1"/>
+                      </a:solidFill>
+                      <a:prstDash val="solid"/>
+                      <a:round/>
+                      <a:headEnd type="none" w="med" len="med"/>
+                      <a:tailEnd type="none" w="med" len="med"/>
+                    </a:lnR>
+                    <a:lnT w="12700" cap="flat" cmpd="sng" algn="ctr">
+                      <a:solidFill>
+                        <a:schemeClr val="bg1"/>
+                      </a:solidFill>
+                      <a:prstDash val="solid"/>
+                      <a:round/>
+                      <a:headEnd type="none" w="med" len="med"/>
+                      <a:tailEnd type="none" w="med" len="med"/>
+                    </a:lnT>
+                    <a:lnB w="12700" cap="flat" cmpd="sng" algn="ctr">
+                      <a:solidFill>
+                        <a:schemeClr val="bg1"/>
+                      </a:solidFill>
+                      <a:prstDash val="solid"/>
+                      <a:round/>
+                      <a:headEnd type="none" w="med" len="med"/>
+                      <a:tailEnd type="none" w="med" len="med"/>
+                    </a:lnB>
+                    <a:lnTlToBr w="12700" cmpd="sng">
+                      <a:noFill/>
+                      <a:prstDash val="solid"/>
+                    </a:lnTlToBr>
+                    <a:lnBlToTr w="12700" cmpd="sng">
+                      <a:noFill/>
+                      <a:prstDash val="solid"/>
+                    </a:lnBlToTr>
+                    <a:solidFill>
+                      <a:srgbClr val="E8EEF8"/>
+                    </a:solidFill>
+                  </a:tcPr>
+                </a:tc>
+                <a:tc hMerge="1">
+                  <a:txBody>
+                    <a:bodyPr/>
+                    <a:lstStyle/>
+                    <a:p>
+                      <a:endParaRPr lang="en-US"/>
+                    </a:p>
+                  </a:txBody>
+                  <a:tcPr>
+                    <a:lnL w="12700" cap="flat" cmpd="sng" algn="ctr">
+                      <a:solidFill>
+                        <a:schemeClr val="bg1"/>
+                      </a:solidFill>
+                      <a:prstDash val="solid"/>
+                      <a:round/>
+                      <a:headEnd type="none" w="med" len="med"/>
+                      <a:tailEnd type="none" w="med" len="med"/>
+                    </a:lnL>
+                  </a:tcPr>
+                </a:tc>
+                <a:tc hMerge="1">
+                  <a:txBody>
+                    <a:bodyPr/>
+                    <a:lstStyle/>
+                    <a:p>
+                      <a:endParaRPr lang="en-US"/>
+                    </a:p>
+                  </a:txBody>
+                  <a:tcPr>
+                    <a:lnL w="12700" cap="flat" cmpd="sng" algn="ctr">
+                      <a:solidFill>
+                        <a:schemeClr val="bg1"/>
+                      </a:solidFill>
+                      <a:prstDash val="solid"/>
+                      <a:round/>
+                      <a:headEnd type="none" w="med" len="med"/>
+                      <a:tailEnd type="none" w="med" len="med"/>
+                    </a:lnL>
+                  </a:tcPr>
+                </a:tc>
+                <a:extLst>
+                  <a:ext uri="{0D108BD9-81ED-4DB2-BD59-A6C34878D82A}">
+                    <a16:rowId xmlns:a16="http://schemas.microsoft.com/office/drawing/2014/main" val="337105121"/>
+                  </a:ext>
+                </a:extLst>
+              </a:tr>
+              <a:tr h="523846">
+                <a:tc>
+                  <a:txBody>
+                    <a:bodyPr/>
+                    <a:lstStyle/>
+                    <a:p>
+                      <a:pPr algn="ctr"/>
+                      <a:r>
+                        <a:rPr lang="en-US" sz="1400" b="0" dirty="0">
+                          <a:solidFill>
+                            <a:sysClr val="windowText" lastClr="000000"/>
+                          </a:solidFill>
+                        </a:rPr>
+                        <a:t>Sampling time </a:t>
+                      </a:r>
+                    </a:p>
+                    <a:p>
+                      <a:pPr algn="ctr"/>
+                      <a:r>
+                        <a:rPr lang="en-US" sz="1400" b="0" dirty="0">
+                          <a:solidFill>
+                            <a:sysClr val="windowText" lastClr="000000"/>
+                          </a:solidFill>
+                        </a:rPr>
+                        <a:t>interval</a:t>
+                      </a:r>
+                    </a:p>
+                  </a:txBody>
+                  <a:tcPr marL="45720" marR="45720" anchor="ctr">
+                    <a:lnL w="12700" cap="flat" cmpd="sng" algn="ctr">
+                      <a:solidFill>
+                        <a:schemeClr val="bg1"/>
+                      </a:solidFill>
+                      <a:prstDash val="solid"/>
+                      <a:round/>
+                      <a:headEnd type="none" w="med" len="med"/>
+                      <a:tailEnd type="none" w="med" len="med"/>
+                    </a:lnL>
+                    <a:lnR w="12700" cap="flat" cmpd="sng" algn="ctr">
+                      <a:solidFill>
+                        <a:schemeClr val="bg1"/>
+                      </a:solidFill>
+                      <a:prstDash val="solid"/>
+                      <a:round/>
+                      <a:headEnd type="none" w="med" len="med"/>
+                      <a:tailEnd type="none" w="med" len="med"/>
+                    </a:lnR>
+                    <a:lnT w="12700" cap="flat" cmpd="sng" algn="ctr">
+                      <a:solidFill>
+                        <a:schemeClr val="bg1"/>
+                      </a:solidFill>
+                      <a:prstDash val="solid"/>
+                      <a:round/>
+                      <a:headEnd type="none" w="med" len="med"/>
+                      <a:tailEnd type="none" w="med" len="med"/>
+                    </a:lnT>
+                    <a:lnB w="12700" cap="flat" cmpd="sng" algn="ctr">
+                      <a:solidFill>
+                        <a:schemeClr val="bg1"/>
+                      </a:solidFill>
+                      <a:prstDash val="solid"/>
+                      <a:round/>
+                      <a:headEnd type="none" w="med" len="med"/>
+                      <a:tailEnd type="none" w="med" len="med"/>
+                    </a:lnB>
+                    <a:lnTlToBr w="12700" cmpd="sng">
+                      <a:noFill/>
+                      <a:prstDash val="solid"/>
+                    </a:lnTlToBr>
+                    <a:lnBlToTr w="12700" cmpd="sng">
+                      <a:noFill/>
+                      <a:prstDash val="solid"/>
+                    </a:lnBlToTr>
+                    <a:solidFill>
+                      <a:srgbClr val="BFD0EB"/>
+                    </a:solidFill>
+                  </a:tcPr>
+                </a:tc>
+                <a:tc gridSpan="3">
+                  <a:txBody>
+                    <a:bodyPr/>
+                    <a:lstStyle/>
+                    <a:p>
+                      <a:pPr algn="ctr"/>
+                      <a:endParaRPr lang="en-US" sz="1400" dirty="0">
+                        <a:solidFill>
+                          <a:sysClr val="windowText" lastClr="000000"/>
+                        </a:solidFill>
+                        <a:latin typeface="+mn-lt"/>
+                      </a:endParaRPr>
+                    </a:p>
+                  </a:txBody>
+                  <a:tcPr marL="45720" marR="45720" anchor="ctr">
+                    <a:lnL w="12700" cap="flat" cmpd="sng" algn="ctr">
+                      <a:solidFill>
+                        <a:schemeClr val="bg1"/>
+                      </a:solidFill>
+                      <a:prstDash val="solid"/>
+                      <a:round/>
+                      <a:headEnd type="none" w="med" len="med"/>
+                      <a:tailEnd type="none" w="med" len="med"/>
+                    </a:lnL>
+                    <a:lnR w="12700" cap="flat" cmpd="sng" algn="ctr">
+                      <a:solidFill>
+                        <a:schemeClr val="bg1"/>
+                      </a:solidFill>
+                      <a:prstDash val="solid"/>
+                      <a:round/>
+                      <a:headEnd type="none" w="med" len="med"/>
+                      <a:tailEnd type="none" w="med" len="med"/>
+                    </a:lnR>
+                    <a:lnT w="12700" cap="flat" cmpd="sng" algn="ctr">
+                      <a:solidFill>
+                        <a:schemeClr val="bg1"/>
+                      </a:solidFill>
+                      <a:prstDash val="solid"/>
+                      <a:round/>
+                      <a:headEnd type="none" w="med" len="med"/>
+                      <a:tailEnd type="none" w="med" len="med"/>
+                    </a:lnT>
+                    <a:lnB w="12700" cap="flat" cmpd="sng" algn="ctr">
+                      <a:solidFill>
+                        <a:schemeClr val="bg1"/>
+                      </a:solidFill>
+                      <a:prstDash val="solid"/>
+                      <a:round/>
+                      <a:headEnd type="none" w="med" len="med"/>
+                      <a:tailEnd type="none" w="med" len="med"/>
+                    </a:lnB>
+                    <a:lnTlToBr w="12700" cmpd="sng">
+                      <a:noFill/>
+                      <a:prstDash val="solid"/>
+                    </a:lnTlToBr>
+                    <a:lnBlToTr w="12700" cmpd="sng">
+                      <a:noFill/>
+                      <a:prstDash val="solid"/>
+                    </a:lnBlToTr>
+                    <a:solidFill>
+                      <a:srgbClr val="E8EEF8"/>
+                    </a:solidFill>
+                  </a:tcPr>
+                </a:tc>
+                <a:tc hMerge="1">
+                  <a:txBody>
+                    <a:bodyPr/>
+                    <a:lstStyle/>
+                    <a:p>
+                      <a:endParaRPr lang="en-US"/>
+                    </a:p>
+                  </a:txBody>
+                  <a:tcPr>
+                    <a:lnL w="12700" cap="flat" cmpd="sng" algn="ctr">
+                      <a:solidFill>
+                        <a:schemeClr val="bg1"/>
+                      </a:solidFill>
+                      <a:prstDash val="solid"/>
+                      <a:round/>
+                      <a:headEnd type="none" w="med" len="med"/>
+                      <a:tailEnd type="none" w="med" len="med"/>
+                    </a:lnL>
+                  </a:tcPr>
+                </a:tc>
+                <a:tc hMerge="1">
+                  <a:txBody>
+                    <a:bodyPr/>
+                    <a:lstStyle/>
+                    <a:p>
+                      <a:endParaRPr lang="en-US"/>
+                    </a:p>
+                  </a:txBody>
+                  <a:tcPr>
+                    <a:lnL w="12700" cap="flat" cmpd="sng" algn="ctr">
+                      <a:solidFill>
+                        <a:schemeClr val="bg1"/>
+                      </a:solidFill>
+                      <a:prstDash val="solid"/>
+                      <a:round/>
+                      <a:headEnd type="none" w="med" len="med"/>
+                      <a:tailEnd type="none" w="med" len="med"/>
+                    </a:lnL>
+                  </a:tcPr>
+                </a:tc>
+                <a:extLst>
+                  <a:ext uri="{0D108BD9-81ED-4DB2-BD59-A6C34878D82A}">
+                    <a16:rowId xmlns:a16="http://schemas.microsoft.com/office/drawing/2014/main" val="3905263702"/>
+                  </a:ext>
+                </a:extLst>
+              </a:tr>
+              <a:tr h="454025">
+                <a:tc rowSpan="3">
+                  <a:txBody>
+                    <a:bodyPr/>
+                    <a:lstStyle/>
+                    <a:p>
+                      <a:pPr algn="ctr"/>
+                      <a:r>
+                        <a:rPr lang="en-US" sz="1400" dirty="0">
+                          <a:solidFill>
+                            <a:sysClr val="windowText" lastClr="000000"/>
+                          </a:solidFill>
+                        </a:rPr>
+                        <a:t>Sensor serial </a:t>
+                      </a:r>
+                    </a:p>
+                    <a:p>
+                      <a:pPr algn="ctr"/>
+                      <a:r>
+                        <a:rPr lang="en-US" sz="1400" dirty="0">
+                          <a:solidFill>
+                            <a:sysClr val="windowText" lastClr="000000"/>
+                          </a:solidFill>
+                        </a:rPr>
+                        <a:t>numbers</a:t>
+                      </a:r>
+                    </a:p>
+                  </a:txBody>
+                  <a:tcPr marL="45720" marR="45720" anchor="ctr">
+                    <a:lnL w="12700" cap="flat" cmpd="sng" algn="ctr">
+                      <a:solidFill>
+                        <a:schemeClr val="bg1"/>
+                      </a:solidFill>
+                      <a:prstDash val="solid"/>
+                      <a:round/>
+                      <a:headEnd type="none" w="med" len="med"/>
+                      <a:tailEnd type="none" w="med" len="med"/>
+                    </a:lnL>
+                    <a:lnR w="12700" cap="flat" cmpd="sng" algn="ctr">
+                      <a:solidFill>
+                        <a:schemeClr val="bg1"/>
+                      </a:solidFill>
+                      <a:prstDash val="solid"/>
+                      <a:round/>
+                      <a:headEnd type="none" w="med" len="med"/>
+                      <a:tailEnd type="none" w="med" len="med"/>
+                    </a:lnR>
+                    <a:lnT w="12700" cap="flat" cmpd="sng" algn="ctr">
+                      <a:solidFill>
+                        <a:schemeClr val="bg1"/>
+                      </a:solidFill>
+                      <a:prstDash val="solid"/>
+                      <a:round/>
+                      <a:headEnd type="none" w="med" len="med"/>
+                      <a:tailEnd type="none" w="med" len="med"/>
+                    </a:lnT>
+                    <a:lnB w="12700" cap="flat" cmpd="sng" algn="ctr">
+                      <a:solidFill>
+                        <a:schemeClr val="bg1"/>
+                      </a:solidFill>
+                      <a:prstDash val="solid"/>
+                      <a:round/>
+                      <a:headEnd type="none" w="med" len="med"/>
+                      <a:tailEnd type="none" w="med" len="med"/>
+                    </a:lnB>
+                    <a:lnTlToBr w="12700" cmpd="sng">
+                      <a:noFill/>
+                      <a:prstDash val="solid"/>
+                    </a:lnTlToBr>
+                    <a:lnBlToTr w="12700" cmpd="sng">
+                      <a:noFill/>
+                      <a:prstDash val="solid"/>
+                    </a:lnBlToTr>
+                    <a:solidFill>
+                      <a:srgbClr val="BFD0EB"/>
+                    </a:solidFill>
+                  </a:tcPr>
+                </a:tc>
+                <a:tc>
+                  <a:txBody>
+                    <a:bodyPr/>
+                    <a:lstStyle/>
+                    <a:p>
+                      <a:pPr marL="0" marR="0" lvl="0" indent="0" algn="ctr" defTabSz="1554480" rtl="0" eaLnBrk="1" fontAlgn="auto" latinLnBrk="0" hangingPunct="1">
+                        <a:lnSpc>
+                          <a:spcPct val="100000"/>
+                        </a:lnSpc>
+                        <a:spcBef>
+                          <a:spcPts val="0"/>
+                        </a:spcBef>
+                        <a:spcAft>
+                          <a:spcPts val="0"/>
+                        </a:spcAft>
+                        <a:buClrTx/>
+                        <a:buSzTx/>
+                        <a:buFontTx/>
+                        <a:buNone/>
+                        <a:tabLst/>
+                        <a:defRPr/>
+                      </a:pPr>
+                      <a:endParaRPr lang="en-US" sz="1050" dirty="0">
+                        <a:solidFill>
+                          <a:sysClr val="windowText" lastClr="000000"/>
+                        </a:solidFill>
+                        <a:latin typeface="+mn-lt"/>
+                      </a:endParaRPr>
+                    </a:p>
+                  </a:txBody>
+                  <a:tcPr marL="45720" marR="45720" anchor="ctr">
+                    <a:lnL w="12700" cap="flat" cmpd="sng" algn="ctr">
+                      <a:solidFill>
+                        <a:schemeClr val="bg1"/>
+                      </a:solidFill>
+                      <a:prstDash val="solid"/>
+                      <a:round/>
+                      <a:headEnd type="none" w="med" len="med"/>
+                      <a:tailEnd type="none" w="med" len="med"/>
+                    </a:lnL>
+                    <a:lnR w="12700" cap="flat" cmpd="sng" algn="ctr">
+                      <a:solidFill>
+                        <a:schemeClr val="bg1"/>
+                      </a:solidFill>
+                      <a:prstDash val="solid"/>
+                      <a:round/>
+                      <a:headEnd type="none" w="med" len="med"/>
+                      <a:tailEnd type="none" w="med" len="med"/>
+                    </a:lnR>
+                    <a:lnT w="12700" cap="flat" cmpd="sng" algn="ctr">
+                      <a:solidFill>
+                        <a:schemeClr val="bg1"/>
+                      </a:solidFill>
+                      <a:prstDash val="solid"/>
+                      <a:round/>
+                      <a:headEnd type="none" w="med" len="med"/>
+                      <a:tailEnd type="none" w="med" len="med"/>
+                    </a:lnT>
+                    <a:lnB w="12700" cap="flat" cmpd="sng" algn="ctr">
+                      <a:solidFill>
+                        <a:schemeClr val="bg1"/>
+                      </a:solidFill>
+                      <a:prstDash val="solid"/>
+                      <a:round/>
+                      <a:headEnd type="none" w="med" len="med"/>
+                      <a:tailEnd type="none" w="med" len="med"/>
+                    </a:lnB>
+                    <a:lnTlToBr w="12700" cmpd="sng">
+                      <a:noFill/>
+                      <a:prstDash val="solid"/>
+                    </a:lnTlToBr>
+                    <a:lnBlToTr w="12700" cmpd="sng">
+                      <a:noFill/>
+                      <a:prstDash val="solid"/>
+                    </a:lnBlToTr>
+                    <a:solidFill>
+                      <a:srgbClr val="E8EEF8"/>
+                    </a:solidFill>
+                  </a:tcPr>
+                </a:tc>
+                <a:tc>
+                  <a:txBody>
+                    <a:bodyPr/>
+                    <a:lstStyle/>
+                    <a:p>
+                      <a:pPr algn="ctr"/>
+                      <a:endParaRPr lang="en-US" sz="1050" dirty="0">
+                        <a:solidFill>
+                          <a:sysClr val="windowText" lastClr="000000"/>
+                        </a:solidFill>
+                        <a:latin typeface="+mn-lt"/>
+                      </a:endParaRPr>
+                    </a:p>
+                  </a:txBody>
+                  <a:tcPr marL="45720" marR="45720" anchor="ctr">
+                    <a:lnL w="12700" cap="flat" cmpd="sng" algn="ctr">
+                      <a:solidFill>
+                        <a:schemeClr val="bg1"/>
+                      </a:solidFill>
+                      <a:prstDash val="solid"/>
+                      <a:round/>
+                      <a:headEnd type="none" w="med" len="med"/>
+                      <a:tailEnd type="none" w="med" len="med"/>
+                    </a:lnL>
+                    <a:lnR w="12700" cap="flat" cmpd="sng" algn="ctr">
+                      <a:solidFill>
+                        <a:schemeClr val="bg1"/>
+                      </a:solidFill>
+                      <a:prstDash val="solid"/>
+                      <a:round/>
+                      <a:headEnd type="none" w="med" len="med"/>
+                      <a:tailEnd type="none" w="med" len="med"/>
+                    </a:lnR>
+                    <a:lnT w="12700" cap="flat" cmpd="sng" algn="ctr">
+                      <a:solidFill>
+                        <a:schemeClr val="bg1"/>
+                      </a:solidFill>
+                      <a:prstDash val="solid"/>
+                      <a:round/>
+                      <a:headEnd type="none" w="med" len="med"/>
+                      <a:tailEnd type="none" w="med" len="med"/>
+                    </a:lnT>
+                    <a:lnB w="12700" cap="flat" cmpd="sng" algn="ctr">
+                      <a:solidFill>
+                        <a:schemeClr val="bg1"/>
+                      </a:solidFill>
+                      <a:prstDash val="solid"/>
+                      <a:round/>
+                      <a:headEnd type="none" w="med" len="med"/>
+                      <a:tailEnd type="none" w="med" len="med"/>
+                    </a:lnB>
+                    <a:lnTlToBr w="12700" cmpd="sng">
+                      <a:noFill/>
+                      <a:prstDash val="solid"/>
+                    </a:lnTlToBr>
+                    <a:lnBlToTr w="12700" cmpd="sng">
+                      <a:noFill/>
+                      <a:prstDash val="solid"/>
+                    </a:lnBlToTr>
+                    <a:solidFill>
+                      <a:srgbClr val="E8EEF8"/>
+                    </a:solidFill>
+                  </a:tcPr>
+                </a:tc>
+                <a:tc>
+                  <a:txBody>
+                    <a:bodyPr/>
+                    <a:lstStyle/>
+                    <a:p>
+                      <a:pPr algn="ctr"/>
+                      <a:endParaRPr lang="en-US" sz="1050" dirty="0">
+                        <a:solidFill>
+                          <a:sysClr val="windowText" lastClr="000000"/>
+                        </a:solidFill>
+                        <a:latin typeface="+mn-lt"/>
+                      </a:endParaRPr>
+                    </a:p>
+                  </a:txBody>
+                  <a:tcPr marL="45720" marR="45720" anchor="ctr">
+                    <a:lnL w="12700" cap="flat" cmpd="sng" algn="ctr">
+                      <a:solidFill>
+                        <a:schemeClr val="bg1"/>
+                      </a:solidFill>
+                      <a:prstDash val="solid"/>
+                      <a:round/>
+                      <a:headEnd type="none" w="med" len="med"/>
+                      <a:tailEnd type="none" w="med" len="med"/>
+                    </a:lnL>
+                    <a:lnR w="12700" cap="flat" cmpd="sng" algn="ctr">
+                      <a:solidFill>
+                        <a:schemeClr val="bg1"/>
+                      </a:solidFill>
+                      <a:prstDash val="solid"/>
+                      <a:round/>
+                      <a:headEnd type="none" w="med" len="med"/>
+                      <a:tailEnd type="none" w="med" len="med"/>
+                    </a:lnR>
+                    <a:lnT w="12700" cap="flat" cmpd="sng" algn="ctr">
+                      <a:solidFill>
+                        <a:schemeClr val="bg1"/>
+                      </a:solidFill>
+                      <a:prstDash val="solid"/>
+                      <a:round/>
+                      <a:headEnd type="none" w="med" len="med"/>
+                      <a:tailEnd type="none" w="med" len="med"/>
+                    </a:lnT>
+                    <a:lnB w="12700" cap="flat" cmpd="sng" algn="ctr">
+                      <a:solidFill>
+                        <a:schemeClr val="bg1"/>
+                      </a:solidFill>
+                      <a:prstDash val="solid"/>
+                      <a:round/>
+                      <a:headEnd type="none" w="med" len="med"/>
+                      <a:tailEnd type="none" w="med" len="med"/>
+                    </a:lnB>
+                    <a:lnTlToBr w="12700" cmpd="sng">
+                      <a:noFill/>
+                      <a:prstDash val="solid"/>
+                    </a:lnTlToBr>
+                    <a:lnBlToTr w="12700" cmpd="sng">
+                      <a:noFill/>
+                      <a:prstDash val="solid"/>
+                    </a:lnBlToTr>
+                    <a:solidFill>
+                      <a:srgbClr val="E8EEF8"/>
+                    </a:solidFill>
+                  </a:tcPr>
+                </a:tc>
+                <a:extLst>
+                  <a:ext uri="{0D108BD9-81ED-4DB2-BD59-A6C34878D82A}">
+                    <a16:rowId xmlns:a16="http://schemas.microsoft.com/office/drawing/2014/main" val="1925963944"/>
+                  </a:ext>
+                </a:extLst>
+              </a:tr>
+              <a:tr h="454025">
+                <a:tc vMerge="1">
+                  <a:txBody>
+                    <a:bodyPr/>
+                    <a:lstStyle/>
+                    <a:p>
+                      <a:pPr algn="ctr"/>
+                      <a:endParaRPr lang="en-US" sz="1400" dirty="0">
+                        <a:solidFill>
+                          <a:sysClr val="windowText" lastClr="000000"/>
+                        </a:solidFill>
+                      </a:endParaRPr>
+                    </a:p>
+                  </a:txBody>
+                  <a:tcPr marL="45720" marR="45720" anchor="ctr">
+                    <a:lnL w="12700" cap="flat" cmpd="sng" algn="ctr">
+                      <a:solidFill>
+                        <a:schemeClr val="bg1"/>
+                      </a:solidFill>
+                      <a:prstDash val="solid"/>
+                      <a:round/>
+                      <a:headEnd type="none" w="med" len="med"/>
+                      <a:tailEnd type="none" w="med" len="med"/>
+                    </a:lnL>
+                    <a:lnR w="12700" cap="flat" cmpd="sng" algn="ctr">
+                      <a:solidFill>
+                        <a:schemeClr val="bg1"/>
+                      </a:solidFill>
+                      <a:prstDash val="solid"/>
+                      <a:round/>
+                      <a:headEnd type="none" w="med" len="med"/>
+                      <a:tailEnd type="none" w="med" len="med"/>
+                    </a:lnR>
+                    <a:lnT w="12700" cap="flat" cmpd="sng" algn="ctr">
+                      <a:solidFill>
+                        <a:schemeClr val="bg1"/>
+                      </a:solidFill>
+                      <a:prstDash val="solid"/>
+                      <a:round/>
+                      <a:headEnd type="none" w="med" len="med"/>
+                      <a:tailEnd type="none" w="med" len="med"/>
+                    </a:lnT>
+                    <a:lnB w="12700" cap="flat" cmpd="sng" algn="ctr">
+                      <a:solidFill>
+                        <a:schemeClr val="bg1"/>
+                      </a:solidFill>
+                      <a:prstDash val="solid"/>
+                      <a:round/>
+                      <a:headEnd type="none" w="med" len="med"/>
+                      <a:tailEnd type="none" w="med" len="med"/>
+                    </a:lnB>
+                    <a:lnTlToBr w="12700" cmpd="sng">
+                      <a:noFill/>
+                      <a:prstDash val="solid"/>
+                    </a:lnTlToBr>
+                    <a:lnBlToTr w="12700" cmpd="sng">
+                      <a:noFill/>
+                      <a:prstDash val="solid"/>
+                    </a:lnBlToTr>
+                    <a:solidFill>
+                      <a:srgbClr val="BFD0EB"/>
+                    </a:solidFill>
+                  </a:tcPr>
+                </a:tc>
+                <a:tc>
+                  <a:txBody>
+                    <a:bodyPr/>
+                    <a:lstStyle/>
+                    <a:p>
+                      <a:pPr marL="0" marR="0" lvl="0" indent="0" algn="ctr" defTabSz="1554480" rtl="0" eaLnBrk="1" fontAlgn="auto" latinLnBrk="0" hangingPunct="1">
+                        <a:lnSpc>
+                          <a:spcPct val="100000"/>
+                        </a:lnSpc>
+                        <a:spcBef>
+                          <a:spcPts val="0"/>
+                        </a:spcBef>
+                        <a:spcAft>
+                          <a:spcPts val="0"/>
+                        </a:spcAft>
+                        <a:buClrTx/>
+                        <a:buSzTx/>
+                        <a:buFontTx/>
+                        <a:buNone/>
+                        <a:tabLst/>
+                        <a:defRPr/>
+                      </a:pPr>
+                      <a:endParaRPr lang="en-US" sz="1050" dirty="0">
+                        <a:solidFill>
+                          <a:sysClr val="windowText" lastClr="000000"/>
+                        </a:solidFill>
+                        <a:latin typeface="+mn-lt"/>
+                      </a:endParaRPr>
+                    </a:p>
+                  </a:txBody>
+                  <a:tcPr marL="45720" marR="45720" anchor="ctr">
+                    <a:lnL w="12700" cap="flat" cmpd="sng" algn="ctr">
+                      <a:solidFill>
+                        <a:schemeClr val="bg1"/>
+                      </a:solidFill>
+                      <a:prstDash val="solid"/>
+                      <a:round/>
+                      <a:headEnd type="none" w="med" len="med"/>
+                      <a:tailEnd type="none" w="med" len="med"/>
+                    </a:lnL>
+                    <a:lnR w="12700" cap="flat" cmpd="sng" algn="ctr">
+                      <a:solidFill>
+                        <a:schemeClr val="bg1"/>
+                      </a:solidFill>
+                      <a:prstDash val="solid"/>
+                      <a:round/>
+                      <a:headEnd type="none" w="med" len="med"/>
+                      <a:tailEnd type="none" w="med" len="med"/>
+                    </a:lnR>
+                    <a:lnT w="12700" cap="flat" cmpd="sng" algn="ctr">
+                      <a:solidFill>
+                        <a:schemeClr val="bg1"/>
+                      </a:solidFill>
+                      <a:prstDash val="solid"/>
+                      <a:round/>
+                      <a:headEnd type="none" w="med" len="med"/>
+                      <a:tailEnd type="none" w="med" len="med"/>
+                    </a:lnT>
+                    <a:lnB w="12700" cap="flat" cmpd="sng" algn="ctr">
+                      <a:solidFill>
+                        <a:schemeClr val="bg1"/>
+                      </a:solidFill>
+                      <a:prstDash val="solid"/>
+                      <a:round/>
+                      <a:headEnd type="none" w="med" len="med"/>
+                      <a:tailEnd type="none" w="med" len="med"/>
+                    </a:lnB>
+                    <a:lnTlToBr w="12700" cmpd="sng">
+                      <a:noFill/>
+                      <a:prstDash val="solid"/>
+                    </a:lnTlToBr>
+                    <a:lnBlToTr w="12700" cmpd="sng">
+                      <a:noFill/>
+                      <a:prstDash val="solid"/>
+                    </a:lnBlToTr>
+                    <a:solidFill>
+                      <a:srgbClr val="E8EEF8"/>
+                    </a:solidFill>
+                  </a:tcPr>
+                </a:tc>
+                <a:tc>
+                  <a:txBody>
+                    <a:bodyPr/>
+                    <a:lstStyle/>
+                    <a:p>
+                      <a:pPr algn="ctr"/>
+                      <a:endParaRPr lang="en-US" sz="1050" dirty="0">
+                        <a:solidFill>
+                          <a:sysClr val="windowText" lastClr="000000"/>
+                        </a:solidFill>
+                        <a:latin typeface="+mn-lt"/>
+                      </a:endParaRPr>
+                    </a:p>
+                  </a:txBody>
+                  <a:tcPr marL="45720" marR="45720" anchor="ctr">
+                    <a:lnL w="12700" cap="flat" cmpd="sng" algn="ctr">
+                      <a:solidFill>
+                        <a:schemeClr val="bg1"/>
+                      </a:solidFill>
+                      <a:prstDash val="solid"/>
+                      <a:round/>
+                      <a:headEnd type="none" w="med" len="med"/>
+                      <a:tailEnd type="none" w="med" len="med"/>
+                    </a:lnL>
+                    <a:lnR w="12700" cap="flat" cmpd="sng" algn="ctr">
+                      <a:solidFill>
+                        <a:schemeClr val="bg1"/>
+                      </a:solidFill>
+                      <a:prstDash val="solid"/>
+                      <a:round/>
+                      <a:headEnd type="none" w="med" len="med"/>
+                      <a:tailEnd type="none" w="med" len="med"/>
+                    </a:lnR>
+                    <a:lnT w="12700" cap="flat" cmpd="sng" algn="ctr">
+                      <a:solidFill>
+                        <a:schemeClr val="bg1"/>
+                      </a:solidFill>
+                      <a:prstDash val="solid"/>
+                      <a:round/>
+                      <a:headEnd type="none" w="med" len="med"/>
+                      <a:tailEnd type="none" w="med" len="med"/>
+                    </a:lnT>
+                    <a:lnB w="12700" cap="flat" cmpd="sng" algn="ctr">
+                      <a:solidFill>
+                        <a:schemeClr val="bg1"/>
+                      </a:solidFill>
+                      <a:prstDash val="solid"/>
+                      <a:round/>
+                      <a:headEnd type="none" w="med" len="med"/>
+                      <a:tailEnd type="none" w="med" len="med"/>
+                    </a:lnB>
+                    <a:lnTlToBr w="12700" cmpd="sng">
+                      <a:noFill/>
+                      <a:prstDash val="solid"/>
+                    </a:lnTlToBr>
+                    <a:lnBlToTr w="12700" cmpd="sng">
+                      <a:noFill/>
+                      <a:prstDash val="solid"/>
+                    </a:lnBlToTr>
+                    <a:solidFill>
+                      <a:srgbClr val="E8EEF8"/>
+                    </a:solidFill>
+                  </a:tcPr>
+                </a:tc>
+                <a:tc>
+                  <a:txBody>
+                    <a:bodyPr/>
+                    <a:lstStyle/>
+                    <a:p>
+                      <a:pPr algn="ctr"/>
+                      <a:endParaRPr lang="en-US" sz="1050" dirty="0">
+                        <a:solidFill>
+                          <a:sysClr val="windowText" lastClr="000000"/>
+                        </a:solidFill>
+                        <a:latin typeface="+mn-lt"/>
+                      </a:endParaRPr>
+                    </a:p>
+                  </a:txBody>
+                  <a:tcPr marL="45720" marR="45720" anchor="ctr">
+                    <a:lnL w="12700" cap="flat" cmpd="sng" algn="ctr">
+                      <a:solidFill>
+                        <a:schemeClr val="bg1"/>
+                      </a:solidFill>
+                      <a:prstDash val="solid"/>
+                      <a:round/>
+                      <a:headEnd type="none" w="med" len="med"/>
+                      <a:tailEnd type="none" w="med" len="med"/>
+                    </a:lnL>
+                    <a:lnR w="12700" cap="flat" cmpd="sng" algn="ctr">
+                      <a:solidFill>
+                        <a:schemeClr val="bg1"/>
+                      </a:solidFill>
+                      <a:prstDash val="solid"/>
+                      <a:round/>
+                      <a:headEnd type="none" w="med" len="med"/>
+                      <a:tailEnd type="none" w="med" len="med"/>
+                    </a:lnR>
+                    <a:lnT w="12700" cap="flat" cmpd="sng" algn="ctr">
+                      <a:solidFill>
+                        <a:schemeClr val="bg1"/>
+                      </a:solidFill>
+                      <a:prstDash val="solid"/>
+                      <a:round/>
+                      <a:headEnd type="none" w="med" len="med"/>
+                      <a:tailEnd type="none" w="med" len="med"/>
+                    </a:lnT>
+                    <a:lnB w="12700" cap="flat" cmpd="sng" algn="ctr">
+                      <a:solidFill>
+                        <a:schemeClr val="bg1"/>
+                      </a:solidFill>
+                      <a:prstDash val="solid"/>
+                      <a:round/>
+                      <a:headEnd type="none" w="med" len="med"/>
+                      <a:tailEnd type="none" w="med" len="med"/>
+                    </a:lnB>
+                    <a:lnTlToBr w="12700" cmpd="sng">
+                      <a:noFill/>
+                      <a:prstDash val="solid"/>
+                    </a:lnTlToBr>
+                    <a:lnBlToTr w="12700" cmpd="sng">
+                      <a:noFill/>
+                      <a:prstDash val="solid"/>
+                    </a:lnBlToTr>
+                    <a:solidFill>
+                      <a:srgbClr val="E8EEF8"/>
+                    </a:solidFill>
+                  </a:tcPr>
+                </a:tc>
+                <a:extLst>
+                  <a:ext uri="{0D108BD9-81ED-4DB2-BD59-A6C34878D82A}">
+                    <a16:rowId xmlns:a16="http://schemas.microsoft.com/office/drawing/2014/main" val="3779271849"/>
+                  </a:ext>
+                </a:extLst>
+              </a:tr>
+              <a:tr h="454025">
+                <a:tc vMerge="1">
+                  <a:txBody>
+                    <a:bodyPr/>
+                    <a:lstStyle/>
+                    <a:p>
+                      <a:pPr algn="ctr"/>
+                      <a:endParaRPr lang="en-US" sz="1400" dirty="0">
+                        <a:solidFill>
+                          <a:sysClr val="windowText" lastClr="000000"/>
+                        </a:solidFill>
+                      </a:endParaRPr>
+                    </a:p>
+                  </a:txBody>
+                  <a:tcPr marL="45720" marR="45720" anchor="ctr">
+                    <a:lnL w="12700" cap="flat" cmpd="sng" algn="ctr">
+                      <a:solidFill>
+                        <a:schemeClr val="bg1"/>
+                      </a:solidFill>
+                      <a:prstDash val="solid"/>
+                      <a:round/>
+                      <a:headEnd type="none" w="med" len="med"/>
+                      <a:tailEnd type="none" w="med" len="med"/>
+                    </a:lnL>
+                    <a:lnR w="12700" cap="flat" cmpd="sng" algn="ctr">
+                      <a:solidFill>
+                        <a:schemeClr val="bg1"/>
+                      </a:solidFill>
+                      <a:prstDash val="solid"/>
+                      <a:round/>
+                      <a:headEnd type="none" w="med" len="med"/>
+                      <a:tailEnd type="none" w="med" len="med"/>
+                    </a:lnR>
+                    <a:lnT w="12700" cap="flat" cmpd="sng" algn="ctr">
+                      <a:solidFill>
+                        <a:schemeClr val="bg1"/>
+                      </a:solidFill>
+                      <a:prstDash val="solid"/>
+                      <a:round/>
+                      <a:headEnd type="none" w="med" len="med"/>
+                      <a:tailEnd type="none" w="med" len="med"/>
+                    </a:lnT>
+                    <a:lnB w="12700" cap="flat" cmpd="sng" algn="ctr">
+                      <a:solidFill>
+                        <a:schemeClr val="bg1"/>
+                      </a:solidFill>
+                      <a:prstDash val="solid"/>
+                      <a:round/>
+                      <a:headEnd type="none" w="med" len="med"/>
+                      <a:tailEnd type="none" w="med" len="med"/>
+                    </a:lnB>
+                    <a:lnTlToBr w="12700" cmpd="sng">
+                      <a:noFill/>
+                      <a:prstDash val="solid"/>
+                    </a:lnTlToBr>
+                    <a:lnBlToTr w="12700" cmpd="sng">
+                      <a:noFill/>
+                      <a:prstDash val="solid"/>
+                    </a:lnBlToTr>
+                    <a:solidFill>
+                      <a:srgbClr val="BFD0EB"/>
+                    </a:solidFill>
+                  </a:tcPr>
+                </a:tc>
+                <a:tc>
+                  <a:txBody>
+                    <a:bodyPr/>
+                    <a:lstStyle/>
+                    <a:p>
+                      <a:pPr marL="0" marR="0" lvl="0" indent="0" algn="ctr" defTabSz="1554480" rtl="0" eaLnBrk="1" fontAlgn="auto" latinLnBrk="0" hangingPunct="1">
+                        <a:lnSpc>
+                          <a:spcPct val="100000"/>
+                        </a:lnSpc>
+                        <a:spcBef>
+                          <a:spcPts val="0"/>
+                        </a:spcBef>
+                        <a:spcAft>
+                          <a:spcPts val="0"/>
+                        </a:spcAft>
+                        <a:buClrTx/>
+                        <a:buSzTx/>
+                        <a:buFontTx/>
+                        <a:buNone/>
+                        <a:tabLst/>
+                        <a:defRPr/>
+                      </a:pPr>
+                      <a:endParaRPr lang="en-US" sz="1050" dirty="0">
+                        <a:solidFill>
+                          <a:sysClr val="windowText" lastClr="000000"/>
+                        </a:solidFill>
+                        <a:latin typeface="+mn-lt"/>
+                      </a:endParaRPr>
+                    </a:p>
+                  </a:txBody>
+                  <a:tcPr marL="45720" marR="45720" anchor="ctr">
+                    <a:lnL w="12700" cap="flat" cmpd="sng" algn="ctr">
+                      <a:solidFill>
+                        <a:schemeClr val="bg1"/>
+                      </a:solidFill>
+                      <a:prstDash val="solid"/>
+                      <a:round/>
+                      <a:headEnd type="none" w="med" len="med"/>
+                      <a:tailEnd type="none" w="med" len="med"/>
+                    </a:lnL>
+                    <a:lnR w="12700" cap="flat" cmpd="sng" algn="ctr">
+                      <a:solidFill>
+                        <a:schemeClr val="bg1"/>
+                      </a:solidFill>
+                      <a:prstDash val="solid"/>
+                      <a:round/>
+                      <a:headEnd type="none" w="med" len="med"/>
+                      <a:tailEnd type="none" w="med" len="med"/>
+                    </a:lnR>
+                    <a:lnT w="12700" cap="flat" cmpd="sng" algn="ctr">
+                      <a:solidFill>
+                        <a:schemeClr val="bg1"/>
+                      </a:solidFill>
+                      <a:prstDash val="solid"/>
+                      <a:round/>
+                      <a:headEnd type="none" w="med" len="med"/>
+                      <a:tailEnd type="none" w="med" len="med"/>
+                    </a:lnT>
+                    <a:lnB w="12700" cap="flat" cmpd="sng" algn="ctr">
+                      <a:solidFill>
+                        <a:schemeClr val="bg1"/>
+                      </a:solidFill>
+                      <a:prstDash val="solid"/>
+                      <a:round/>
+                      <a:headEnd type="none" w="med" len="med"/>
+                      <a:tailEnd type="none" w="med" len="med"/>
+                    </a:lnB>
+                    <a:lnTlToBr w="12700" cmpd="sng">
+                      <a:noFill/>
+                      <a:prstDash val="solid"/>
+                    </a:lnTlToBr>
+                    <a:lnBlToTr w="12700" cmpd="sng">
+                      <a:noFill/>
+                      <a:prstDash val="solid"/>
+                    </a:lnBlToTr>
+                    <a:solidFill>
+                      <a:srgbClr val="E8EEF8"/>
+                    </a:solidFill>
+                  </a:tcPr>
+                </a:tc>
+                <a:tc>
+                  <a:txBody>
+                    <a:bodyPr/>
+                    <a:lstStyle/>
+                    <a:p>
+                      <a:pPr algn="ctr"/>
+                      <a:endParaRPr lang="en-US" sz="1050" dirty="0">
+                        <a:solidFill>
+                          <a:sysClr val="windowText" lastClr="000000"/>
+                        </a:solidFill>
+                        <a:latin typeface="+mn-lt"/>
+                      </a:endParaRPr>
+                    </a:p>
+                  </a:txBody>
+                  <a:tcPr marL="45720" marR="45720" anchor="ctr">
+                    <a:lnL w="12700" cap="flat" cmpd="sng" algn="ctr">
+                      <a:solidFill>
+                        <a:schemeClr val="bg1"/>
+                      </a:solidFill>
+                      <a:prstDash val="solid"/>
+                      <a:round/>
+                      <a:headEnd type="none" w="med" len="med"/>
+                      <a:tailEnd type="none" w="med" len="med"/>
+                    </a:lnL>
+                    <a:lnR w="12700" cap="flat" cmpd="sng" algn="ctr">
+                      <a:solidFill>
+                        <a:schemeClr val="bg1"/>
+                      </a:solidFill>
+                      <a:prstDash val="solid"/>
+                      <a:round/>
+                      <a:headEnd type="none" w="med" len="med"/>
+                      <a:tailEnd type="none" w="med" len="med"/>
+                    </a:lnR>
+                    <a:lnT w="12700" cap="flat" cmpd="sng" algn="ctr">
+                      <a:solidFill>
+                        <a:schemeClr val="bg1"/>
+                      </a:solidFill>
+                      <a:prstDash val="solid"/>
+                      <a:round/>
+                      <a:headEnd type="none" w="med" len="med"/>
+                      <a:tailEnd type="none" w="med" len="med"/>
+                    </a:lnT>
+                    <a:lnB w="12700" cap="flat" cmpd="sng" algn="ctr">
+                      <a:solidFill>
+                        <a:schemeClr val="bg1"/>
+                      </a:solidFill>
+                      <a:prstDash val="solid"/>
+                      <a:round/>
+                      <a:headEnd type="none" w="med" len="med"/>
+                      <a:tailEnd type="none" w="med" len="med"/>
+                    </a:lnB>
+                    <a:lnTlToBr w="12700" cmpd="sng">
+                      <a:noFill/>
+                      <a:prstDash val="solid"/>
+                    </a:lnTlToBr>
+                    <a:lnBlToTr w="12700" cmpd="sng">
+                      <a:noFill/>
+                      <a:prstDash val="solid"/>
+                    </a:lnBlToTr>
+                    <a:solidFill>
+                      <a:srgbClr val="E8EEF8"/>
+                    </a:solidFill>
+                  </a:tcPr>
+                </a:tc>
+                <a:tc>
+                  <a:txBody>
+                    <a:bodyPr/>
+                    <a:lstStyle/>
+                    <a:p>
+                      <a:pPr algn="ctr"/>
+                      <a:endParaRPr lang="en-US" sz="1050" dirty="0">
+                        <a:solidFill>
+                          <a:sysClr val="windowText" lastClr="000000"/>
+                        </a:solidFill>
+                        <a:latin typeface="+mn-lt"/>
+                      </a:endParaRPr>
+                    </a:p>
+                  </a:txBody>
+                  <a:tcPr marL="45720" marR="45720" anchor="ctr">
+                    <a:lnL w="12700" cap="flat" cmpd="sng" algn="ctr">
+                      <a:solidFill>
+                        <a:schemeClr val="bg1"/>
+                      </a:solidFill>
+                      <a:prstDash val="solid"/>
+                      <a:round/>
+                      <a:headEnd type="none" w="med" len="med"/>
+                      <a:tailEnd type="none" w="med" len="med"/>
+                    </a:lnL>
+                    <a:lnR w="12700" cap="flat" cmpd="sng" algn="ctr">
+                      <a:solidFill>
+                        <a:schemeClr val="bg1"/>
+                      </a:solidFill>
+                      <a:prstDash val="solid"/>
+                      <a:round/>
+                      <a:headEnd type="none" w="med" len="med"/>
+                      <a:tailEnd type="none" w="med" len="med"/>
+                    </a:lnR>
+                    <a:lnT w="12700" cap="flat" cmpd="sng" algn="ctr">
+                      <a:solidFill>
+                        <a:schemeClr val="bg1"/>
+                      </a:solidFill>
+                      <a:prstDash val="solid"/>
+                      <a:round/>
+                      <a:headEnd type="none" w="med" len="med"/>
+                      <a:tailEnd type="none" w="med" len="med"/>
+                    </a:lnT>
+                    <a:lnB w="12700" cap="flat" cmpd="sng" algn="ctr">
+                      <a:solidFill>
+                        <a:schemeClr val="bg1"/>
+                      </a:solidFill>
+                      <a:prstDash val="solid"/>
+                      <a:round/>
+                      <a:headEnd type="none" w="med" len="med"/>
+                      <a:tailEnd type="none" w="med" len="med"/>
+                    </a:lnB>
+                    <a:lnTlToBr w="12700" cmpd="sng">
+                      <a:noFill/>
+                      <a:prstDash val="solid"/>
+                    </a:lnTlToBr>
+                    <a:lnBlToTr w="12700" cmpd="sng">
+                      <a:noFill/>
+                      <a:prstDash val="solid"/>
+                    </a:lnBlToTr>
+                    <a:solidFill>
+                      <a:srgbClr val="E8EEF8"/>
+                    </a:solidFill>
+                  </a:tcPr>
+                </a:tc>
+                <a:extLst>
+                  <a:ext uri="{0D108BD9-81ED-4DB2-BD59-A6C34878D82A}">
+                    <a16:rowId xmlns:a16="http://schemas.microsoft.com/office/drawing/2014/main" val="2358869375"/>
+                  </a:ext>
+                </a:extLst>
+              </a:tr>
+              <a:tr h="777180">
+                <a:tc>
+                  <a:txBody>
+                    <a:bodyPr/>
+                    <a:lstStyle/>
+                    <a:p>
+                      <a:pPr algn="ctr"/>
+                      <a:r>
+                        <a:rPr lang="en-US" sz="1400" dirty="0">
+                          <a:solidFill>
+                            <a:sysClr val="windowText" lastClr="000000"/>
+                          </a:solidFill>
+                        </a:rPr>
+                        <a:t>Issues encountered during deployment?</a:t>
+                      </a:r>
+                    </a:p>
+                  </a:txBody>
+                  <a:tcPr marL="45720" marR="45720" anchor="ctr">
+                    <a:lnL w="12700" cap="flat" cmpd="sng" algn="ctr">
+                      <a:solidFill>
+                        <a:schemeClr val="bg1"/>
+                      </a:solidFill>
+                      <a:prstDash val="solid"/>
+                      <a:round/>
+                      <a:headEnd type="none" w="med" len="med"/>
+                      <a:tailEnd type="none" w="med" len="med"/>
+                    </a:lnL>
+                    <a:lnR w="12700" cap="flat" cmpd="sng" algn="ctr">
+                      <a:solidFill>
+                        <a:schemeClr val="bg1"/>
+                      </a:solidFill>
+                      <a:prstDash val="solid"/>
+                      <a:round/>
+                      <a:headEnd type="none" w="med" len="med"/>
+                      <a:tailEnd type="none" w="med" len="med"/>
+                    </a:lnR>
+                    <a:lnT w="12700" cap="flat" cmpd="sng" algn="ctr">
+                      <a:solidFill>
+                        <a:schemeClr val="bg1"/>
+                      </a:solidFill>
+                      <a:prstDash val="solid"/>
+                      <a:round/>
+                      <a:headEnd type="none" w="med" len="med"/>
+                      <a:tailEnd type="none" w="med" len="med"/>
+                    </a:lnT>
+                    <a:lnB w="12700" cap="flat" cmpd="sng" algn="ctr">
+                      <a:solidFill>
+                        <a:schemeClr val="bg1"/>
+                      </a:solidFill>
+                      <a:prstDash val="solid"/>
+                      <a:round/>
+                      <a:headEnd type="none" w="med" len="med"/>
+                      <a:tailEnd type="none" w="med" len="med"/>
+                    </a:lnB>
+                    <a:lnTlToBr w="12700" cmpd="sng">
+                      <a:noFill/>
+                      <a:prstDash val="solid"/>
+                    </a:lnTlToBr>
+                    <a:lnBlToTr w="12700" cmpd="sng">
+                      <a:noFill/>
+                      <a:prstDash val="solid"/>
+                    </a:lnBlToTr>
+                    <a:solidFill>
+                      <a:srgbClr val="BFD0EB"/>
+                    </a:solidFill>
+                  </a:tcPr>
+                </a:tc>
+                <a:tc>
+                  <a:txBody>
+                    <a:bodyPr/>
+                    <a:lstStyle/>
+                    <a:p>
+                      <a:pPr marL="0" marR="0" lvl="0" indent="0" algn="ctr" defTabSz="1554480" rtl="0" eaLnBrk="1" fontAlgn="auto" latinLnBrk="0" hangingPunct="1">
+                        <a:lnSpc>
+                          <a:spcPct val="100000"/>
+                        </a:lnSpc>
+                        <a:spcBef>
+                          <a:spcPts val="0"/>
+                        </a:spcBef>
+                        <a:spcAft>
+                          <a:spcPts val="0"/>
+                        </a:spcAft>
+                        <a:buClrTx/>
+                        <a:buSzTx/>
+                        <a:buFontTx/>
+                        <a:buNone/>
+                        <a:tabLst/>
+                        <a:defRPr/>
+                      </a:pPr>
+                      <a:r>
+                        <a:rPr lang="en-US" sz="1600" dirty="0">
+                          <a:solidFill>
+                            <a:schemeClr val="tx1"/>
+                          </a:solidFill>
+                          <a:sym typeface="Wingdings" panose="05000000000000000000" pitchFamily="2" charset="2"/>
+                        </a:rPr>
+                        <a:t></a:t>
+                      </a:r>
+                    </a:p>
+                  </a:txBody>
+                  <a:tcPr marL="45720" marR="45720" anchor="ctr">
+                    <a:lnL w="12700" cap="flat" cmpd="sng" algn="ctr">
+                      <a:solidFill>
+                        <a:schemeClr val="bg1"/>
+                      </a:solidFill>
+                      <a:prstDash val="solid"/>
+                      <a:round/>
+                      <a:headEnd type="none" w="med" len="med"/>
+                      <a:tailEnd type="none" w="med" len="med"/>
+                    </a:lnL>
+                    <a:lnR w="12700" cap="flat" cmpd="sng" algn="ctr">
+                      <a:solidFill>
+                        <a:schemeClr val="bg1"/>
+                      </a:solidFill>
+                      <a:prstDash val="solid"/>
+                      <a:round/>
+                      <a:headEnd type="none" w="med" len="med"/>
+                      <a:tailEnd type="none" w="med" len="med"/>
+                    </a:lnR>
+                    <a:lnT w="12700" cap="flat" cmpd="sng" algn="ctr">
+                      <a:solidFill>
+                        <a:schemeClr val="bg1"/>
+                      </a:solidFill>
+                      <a:prstDash val="solid"/>
+                      <a:round/>
+                      <a:headEnd type="none" w="med" len="med"/>
+                      <a:tailEnd type="none" w="med" len="med"/>
+                    </a:lnT>
+                    <a:lnB w="12700" cap="flat" cmpd="sng" algn="ctr">
+                      <a:solidFill>
+                        <a:schemeClr val="bg1"/>
+                      </a:solidFill>
+                      <a:prstDash val="solid"/>
+                      <a:round/>
+                      <a:headEnd type="none" w="med" len="med"/>
+                      <a:tailEnd type="none" w="med" len="med"/>
+                    </a:lnB>
+                    <a:lnTlToBr w="12700" cmpd="sng">
+                      <a:noFill/>
+                      <a:prstDash val="solid"/>
+                    </a:lnTlToBr>
+                    <a:lnBlToTr w="12700" cmpd="sng">
+                      <a:noFill/>
+                      <a:prstDash val="solid"/>
+                    </a:lnBlToTr>
+                    <a:solidFill>
+                      <a:srgbClr val="E8EEF8"/>
+                    </a:solidFill>
+                  </a:tcPr>
+                </a:tc>
+                <a:tc gridSpan="2">
+                  <a:txBody>
+                    <a:bodyPr/>
+                    <a:lstStyle/>
+                    <a:p>
+                      <a:pPr marL="0" marR="0" lvl="0" indent="0" algn="ctr" defTabSz="914400" rtl="0" eaLnBrk="1" fontAlgn="auto" latinLnBrk="0" hangingPunct="1">
+                        <a:lnSpc>
+                          <a:spcPct val="100000"/>
+                        </a:lnSpc>
+                        <a:spcBef>
+                          <a:spcPts val="0"/>
+                        </a:spcBef>
+                        <a:spcAft>
+                          <a:spcPts val="0"/>
+                        </a:spcAft>
+                        <a:buClrTx/>
+                        <a:buSzTx/>
+                        <a:buFontTx/>
+                        <a:buNone/>
+                        <a:tabLst/>
+                        <a:defRPr/>
+                      </a:pPr>
+                      <a:r>
+                        <a:rPr lang="en-US" sz="1400" dirty="0">
+                          <a:solidFill>
+                            <a:sysClr val="windowText" lastClr="000000"/>
+                          </a:solidFill>
+                          <a:latin typeface="+mn-lt"/>
+                        </a:rPr>
+                        <a:t>Brief summary of issues</a:t>
+                      </a:r>
+                      <a:endParaRPr lang="en-US" sz="1400" dirty="0"/>
+                    </a:p>
+                  </a:txBody>
+                  <a:tcPr marL="45720" marR="45720" anchor="ctr">
+                    <a:lnL w="12700" cap="flat" cmpd="sng" algn="ctr">
+                      <a:solidFill>
+                        <a:schemeClr val="bg1"/>
+                      </a:solidFill>
+                      <a:prstDash val="solid"/>
+                      <a:round/>
+                      <a:headEnd type="none" w="med" len="med"/>
+                      <a:tailEnd type="none" w="med" len="med"/>
+                    </a:lnL>
+                    <a:lnR w="12700" cap="flat" cmpd="sng" algn="ctr">
+                      <a:solidFill>
+                        <a:schemeClr val="bg1"/>
+                      </a:solidFill>
+                      <a:prstDash val="solid"/>
+                      <a:round/>
+                      <a:headEnd type="none" w="med" len="med"/>
+                      <a:tailEnd type="none" w="med" len="med"/>
+                    </a:lnR>
+                    <a:lnT w="12700" cap="flat" cmpd="sng" algn="ctr">
+                      <a:solidFill>
+                        <a:schemeClr val="bg1"/>
+                      </a:solidFill>
+                      <a:prstDash val="solid"/>
+                      <a:round/>
+                      <a:headEnd type="none" w="med" len="med"/>
+                      <a:tailEnd type="none" w="med" len="med"/>
+                    </a:lnT>
+                    <a:lnB w="12700" cap="flat" cmpd="sng" algn="ctr">
+                      <a:solidFill>
+                        <a:schemeClr val="bg1"/>
+                      </a:solidFill>
+                      <a:prstDash val="solid"/>
+                      <a:round/>
+                      <a:headEnd type="none" w="med" len="med"/>
+                      <a:tailEnd type="none" w="med" len="med"/>
+                    </a:lnB>
+                    <a:lnTlToBr w="12700" cmpd="sng">
+                      <a:noFill/>
+                      <a:prstDash val="solid"/>
+                    </a:lnTlToBr>
+                    <a:lnBlToTr w="12700" cmpd="sng">
+                      <a:noFill/>
+                      <a:prstDash val="solid"/>
+                    </a:lnBlToTr>
+                    <a:solidFill>
+                      <a:srgbClr val="E8EEF8"/>
+                    </a:solidFill>
+                  </a:tcPr>
+                </a:tc>
+                <a:tc hMerge="1">
+                  <a:txBody>
+                    <a:bodyPr/>
+                    <a:lstStyle/>
+                    <a:p>
+                      <a:pPr algn="ctr"/>
+                      <a:endParaRPr lang="en-US" sz="1400" dirty="0">
+                        <a:solidFill>
+                          <a:sysClr val="windowText" lastClr="000000"/>
+                        </a:solidFill>
+                        <a:latin typeface="+mn-lt"/>
+                      </a:endParaRPr>
+                    </a:p>
+                  </a:txBody>
+                  <a:tcPr marL="201168" marR="201168" marT="100584" marB="100584" anchor="ctr">
+                    <a:lnL w="12700" cap="flat" cmpd="sng" algn="ctr">
+                      <a:solidFill>
+                        <a:schemeClr val="bg1"/>
+                      </a:solidFill>
+                      <a:prstDash val="solid"/>
+                      <a:round/>
+                      <a:headEnd type="none" w="med" len="med"/>
+                      <a:tailEnd type="none" w="med" len="med"/>
+                    </a:lnL>
+                    <a:lnR w="12700" cap="flat" cmpd="sng" algn="ctr">
+                      <a:solidFill>
+                        <a:schemeClr val="bg1"/>
+                      </a:solidFill>
+                      <a:prstDash val="solid"/>
+                      <a:round/>
+                      <a:headEnd type="none" w="med" len="med"/>
+                      <a:tailEnd type="none" w="med" len="med"/>
+                    </a:lnR>
+                    <a:lnT w="12700" cap="flat" cmpd="sng" algn="ctr">
+                      <a:solidFill>
+                        <a:schemeClr val="bg1"/>
+                      </a:solidFill>
+                      <a:prstDash val="solid"/>
+                      <a:round/>
+                      <a:headEnd type="none" w="med" len="med"/>
+                      <a:tailEnd type="none" w="med" len="med"/>
+                    </a:lnT>
+                    <a:lnB w="12700" cap="flat" cmpd="sng" algn="ctr">
+                      <a:solidFill>
+                        <a:schemeClr val="bg1"/>
+                      </a:solidFill>
+                      <a:prstDash val="solid"/>
+                      <a:round/>
+                      <a:headEnd type="none" w="med" len="med"/>
+                      <a:tailEnd type="none" w="med" len="med"/>
+                    </a:lnB>
+                    <a:lnTlToBr w="12700" cmpd="sng">
+                      <a:noFill/>
+                      <a:prstDash val="solid"/>
+                    </a:lnTlToBr>
+                    <a:lnBlToTr w="12700" cmpd="sng">
+                      <a:noFill/>
+                      <a:prstDash val="solid"/>
+                    </a:lnBlToTr>
+                    <a:solidFill>
+                      <a:srgbClr val="E8EEF8"/>
+                    </a:solidFill>
+                  </a:tcPr>
+                </a:tc>
+                <a:extLst>
+                  <a:ext uri="{0D108BD9-81ED-4DB2-BD59-A6C34878D82A}">
+                    <a16:rowId xmlns:a16="http://schemas.microsoft.com/office/drawing/2014/main" val="78851090"/>
+                  </a:ext>
+                </a:extLst>
+              </a:tr>
+            </a:tbl>
+          </a:graphicData>
+        </a:graphic>
+      </p:graphicFrame>
     </p:spTree>
     <p:extLst>
       <p:ext uri="{BB962C8B-B14F-4D97-AF65-F5344CB8AC3E}">
@@ -14520,20 +14369,6 @@
 </file>
 
 <file path=customXml/item1.xml><?xml version="1.0" encoding="utf-8"?>
-<?mso-contentType ?>
-<FormTemplates xmlns="http://schemas.microsoft.com/sharepoint/v3/contenttype/forms">
-  <Display>DocumentLibraryForm</Display>
-  <Edit>DocumentLibraryForm</Edit>
-  <New>DocumentLibraryForm</New>
-</FormTemplates>
-</file>
-
-<file path=customXml/item2.xml><?xml version="1.0" encoding="utf-8"?>
-<?mso-contentType ?>
-<SharedContentType xmlns="Microsoft.SharePoint.Taxonomy.ContentTypeSync" SourceId="29f62856-1543-49d4-a736-4569d363f533" ContentTypeId="0x0101" PreviousValue="false"/>
-</file>
-
-<file path=customXml/item3.xml><?xml version="1.0" encoding="utf-8"?>
 <ct:contentTypeSchema xmlns:ct="http://schemas.microsoft.com/office/2006/metadata/contentType" xmlns:ma="http://schemas.microsoft.com/office/2006/metadata/properties/metaAttributes" ct:_="" ma:_="" ma:contentTypeName="Document" ma:contentTypeID="0x010100564A490502BCE94B94B40D182DF629A7" ma:contentTypeVersion="10" ma:contentTypeDescription="Create a new document." ma:contentTypeScope="" ma:versionID="edc9365ca1982d5cfb353b974c2fd121">
   <xsd:schema xmlns:xsd="http://www.w3.org/2001/XMLSchema" xmlns:xs="http://www.w3.org/2001/XMLSchema" xmlns:p="http://schemas.microsoft.com/office/2006/metadata/properties" xmlns:ns1="http://schemas.microsoft.com/sharepoint/v3" xmlns:ns2="4ffa91fb-a0ff-4ac5-b2db-65c790d184a4" xmlns:ns3="http://schemas.microsoft.com/sharepoint.v3" xmlns:ns4="http://schemas.microsoft.com/sharepoint/v3/fields" xmlns:ns5="92953017-96f5-40cd-8d9e-826506a80b1b" targetNamespace="http://schemas.microsoft.com/office/2006/metadata/properties" ma:root="true" ma:fieldsID="0e17b492b81938533bbafcb3131407c0" ns1:_="" ns2:_="" ns3:_="" ns4:_="" ns5:_="">
     <xsd:import namespace="http://schemas.microsoft.com/sharepoint/v3"/>
@@ -14931,7 +14766,7 @@
 </ct:contentTypeSchema>
 </file>
 
-<file path=customXml/item4.xml><?xml version="1.0" encoding="utf-8"?>
+<file path=customXml/item2.xml><?xml version="1.0" encoding="utf-8"?>
 <p:properties xmlns:p="http://schemas.microsoft.com/office/2006/metadata/properties" xmlns:xsi="http://www.w3.org/2001/XMLSchema-instance" xmlns:pc="http://schemas.microsoft.com/office/infopath/2007/PartnerControls">
   <documentManagement>
     <_Source xmlns="http://schemas.microsoft.com/sharepoint/v3/fields" xsi:nil="true"/>
@@ -14970,23 +14805,21 @@
 </p:properties>
 </file>
 
-<file path=customXml/itemProps1.xml><?xml version="1.0" encoding="utf-8"?>
-<ds:datastoreItem xmlns:ds="http://schemas.openxmlformats.org/officeDocument/2006/customXml" ds:itemID="{E3A66A80-EEBD-4235-BF6F-659447EA7FC0}">
-  <ds:schemaRefs>
-    <ds:schemaRef ds:uri="http://schemas.microsoft.com/sharepoint/v3/contenttype/forms"/>
-  </ds:schemaRefs>
-</ds:datastoreItem>
+<file path=customXml/item3.xml><?xml version="1.0" encoding="utf-8"?>
+<?mso-contentType ?>
+<FormTemplates xmlns="http://schemas.microsoft.com/sharepoint/v3/contenttype/forms">
+  <Display>DocumentLibraryForm</Display>
+  <Edit>DocumentLibraryForm</Edit>
+  <New>DocumentLibraryForm</New>
+</FormTemplates>
 </file>
 
-<file path=customXml/itemProps2.xml><?xml version="1.0" encoding="utf-8"?>
-<ds:datastoreItem xmlns:ds="http://schemas.openxmlformats.org/officeDocument/2006/customXml" ds:itemID="{9D969709-82DA-4F6F-85CB-B966EACA0A33}">
-  <ds:schemaRefs>
-    <ds:schemaRef ds:uri="Microsoft.SharePoint.Taxonomy.ContentTypeSync"/>
-  </ds:schemaRefs>
-</ds:datastoreItem>
+<file path=customXml/item4.xml><?xml version="1.0" encoding="utf-8"?>
+<?mso-contentType ?>
+<SharedContentType xmlns="Microsoft.SharePoint.Taxonomy.ContentTypeSync" SourceId="29f62856-1543-49d4-a736-4569d363f533" ContentTypeId="0x0101" PreviousValue="false"/>
 </file>
 
-<file path=customXml/itemProps3.xml><?xml version="1.0" encoding="utf-8"?>
+<file path=customXml/itemProps1.xml><?xml version="1.0" encoding="utf-8"?>
 <ds:datastoreItem xmlns:ds="http://schemas.openxmlformats.org/officeDocument/2006/customXml" ds:itemID="{2D729AC4-7E4A-4753-A9DC-47559C341E43}">
   <ds:schemaRefs>
     <ds:schemaRef ds:uri="http://schemas.microsoft.com/office/2006/metadata/contentType"/>
@@ -15008,7 +14841,7 @@
 </ds:datastoreItem>
 </file>
 
-<file path=customXml/itemProps4.xml><?xml version="1.0" encoding="utf-8"?>
+<file path=customXml/itemProps2.xml><?xml version="1.0" encoding="utf-8"?>
 <ds:datastoreItem xmlns:ds="http://schemas.openxmlformats.org/officeDocument/2006/customXml" ds:itemID="{2EED311A-CCB5-4625-B52F-BB9F85A51581}">
   <ds:schemaRefs>
     <ds:schemaRef ds:uri="http://schemas.microsoft.com/office/2006/metadata/properties"/>
@@ -15019,4 +14852,20 @@
     <ds:schemaRef ds:uri="http://schemas.microsoft.com/sharepoint.v3"/>
   </ds:schemaRefs>
 </ds:datastoreItem>
+</file>
+
+<file path=customXml/itemProps3.xml><?xml version="1.0" encoding="utf-8"?>
+<ds:datastoreItem xmlns:ds="http://schemas.openxmlformats.org/officeDocument/2006/customXml" ds:itemID="{E3A66A80-EEBD-4235-BF6F-659447EA7FC0}">
+  <ds:schemaRefs>
+    <ds:schemaRef ds:uri="http://schemas.microsoft.com/sharepoint/v3/contenttype/forms"/>
+  </ds:schemaRefs>
+</ds:datastoreItem>
+</file>
+
+<file path=customXml/itemProps4.xml><?xml version="1.0" encoding="utf-8"?>
+<ds:datastoreItem xmlns:ds="http://schemas.openxmlformats.org/officeDocument/2006/customXml" ds:itemID="{9D969709-82DA-4F6F-85CB-B966EACA0A33}">
+  <ds:schemaRefs>
+    <ds:schemaRef ds:uri="Microsoft.SharePoint.Taxonomy.ContentTypeSync"/>
+  </ds:schemaRefs>
+</ds:datastoreItem>
 </file>
</xml_diff>